<commit_message>
Add section 2 of handson3
</commit_message>
<xml_diff>
--- a/handson3/media/figure.pptx
+++ b/handson3/media/figure.pptx
@@ -10,6 +10,8 @@
     <p:sldId id="258" r:id="rId4"/>
     <p:sldId id="259" r:id="rId5"/>
     <p:sldId id="260" r:id="rId6"/>
+    <p:sldId id="262" r:id="rId7"/>
+    <p:sldId id="261" r:id="rId8"/>
   </p:sldIdLst>
   <p:sldSz cx="12192000" cy="6858000"/>
   <p:notesSz cx="6858000" cy="9144000"/>
@@ -263,7 +265,7 @@
           <a:p>
             <a:fld id="{5A1C9A1D-F45E-4798-8D6C-555DCB791BF9}" type="datetimeFigureOut">
               <a:rPr kumimoji="1" lang="ja-JP" altLang="en-US" smtClean="0"/>
-              <a:t>2019/11/2</a:t>
+              <a:t>2019/11/3</a:t>
             </a:fld>
             <a:endParaRPr kumimoji="1" lang="ja-JP" altLang="en-US"/>
           </a:p>
@@ -493,7 +495,7 @@
           <a:p>
             <a:fld id="{5A1C9A1D-F45E-4798-8D6C-555DCB791BF9}" type="datetimeFigureOut">
               <a:rPr kumimoji="1" lang="ja-JP" altLang="en-US" smtClean="0"/>
-              <a:t>2019/11/2</a:t>
+              <a:t>2019/11/3</a:t>
             </a:fld>
             <a:endParaRPr kumimoji="1" lang="ja-JP" altLang="en-US"/>
           </a:p>
@@ -733,7 +735,7 @@
           <a:p>
             <a:fld id="{5A1C9A1D-F45E-4798-8D6C-555DCB791BF9}" type="datetimeFigureOut">
               <a:rPr kumimoji="1" lang="ja-JP" altLang="en-US" smtClean="0"/>
-              <a:t>2019/11/2</a:t>
+              <a:t>2019/11/3</a:t>
             </a:fld>
             <a:endParaRPr kumimoji="1" lang="ja-JP" altLang="en-US"/>
           </a:p>
@@ -963,7 +965,7 @@
           <a:p>
             <a:fld id="{5A1C9A1D-F45E-4798-8D6C-555DCB791BF9}" type="datetimeFigureOut">
               <a:rPr kumimoji="1" lang="ja-JP" altLang="en-US" smtClean="0"/>
-              <a:t>2019/11/2</a:t>
+              <a:t>2019/11/3</a:t>
             </a:fld>
             <a:endParaRPr kumimoji="1" lang="ja-JP" altLang="en-US"/>
           </a:p>
@@ -1238,7 +1240,7 @@
           <a:p>
             <a:fld id="{5A1C9A1D-F45E-4798-8D6C-555DCB791BF9}" type="datetimeFigureOut">
               <a:rPr kumimoji="1" lang="ja-JP" altLang="en-US" smtClean="0"/>
-              <a:t>2019/11/2</a:t>
+              <a:t>2019/11/3</a:t>
             </a:fld>
             <a:endParaRPr kumimoji="1" lang="ja-JP" altLang="en-US"/>
           </a:p>
@@ -1567,7 +1569,7 @@
           <a:p>
             <a:fld id="{5A1C9A1D-F45E-4798-8D6C-555DCB791BF9}" type="datetimeFigureOut">
               <a:rPr kumimoji="1" lang="ja-JP" altLang="en-US" smtClean="0"/>
-              <a:t>2019/11/2</a:t>
+              <a:t>2019/11/3</a:t>
             </a:fld>
             <a:endParaRPr kumimoji="1" lang="ja-JP" altLang="en-US"/>
           </a:p>
@@ -2043,7 +2045,7 @@
           <a:p>
             <a:fld id="{5A1C9A1D-F45E-4798-8D6C-555DCB791BF9}" type="datetimeFigureOut">
               <a:rPr kumimoji="1" lang="ja-JP" altLang="en-US" smtClean="0"/>
-              <a:t>2019/11/2</a:t>
+              <a:t>2019/11/3</a:t>
             </a:fld>
             <a:endParaRPr kumimoji="1" lang="ja-JP" altLang="en-US"/>
           </a:p>
@@ -2184,7 +2186,7 @@
           <a:p>
             <a:fld id="{5A1C9A1D-F45E-4798-8D6C-555DCB791BF9}" type="datetimeFigureOut">
               <a:rPr kumimoji="1" lang="ja-JP" altLang="en-US" smtClean="0"/>
-              <a:t>2019/11/2</a:t>
+              <a:t>2019/11/3</a:t>
             </a:fld>
             <a:endParaRPr kumimoji="1" lang="ja-JP" altLang="en-US"/>
           </a:p>
@@ -2297,7 +2299,7 @@
           <a:p>
             <a:fld id="{5A1C9A1D-F45E-4798-8D6C-555DCB791BF9}" type="datetimeFigureOut">
               <a:rPr kumimoji="1" lang="ja-JP" altLang="en-US" smtClean="0"/>
-              <a:t>2019/11/2</a:t>
+              <a:t>2019/11/3</a:t>
             </a:fld>
             <a:endParaRPr kumimoji="1" lang="ja-JP" altLang="en-US"/>
           </a:p>
@@ -2640,7 +2642,7 @@
           <a:p>
             <a:fld id="{5A1C9A1D-F45E-4798-8D6C-555DCB791BF9}" type="datetimeFigureOut">
               <a:rPr kumimoji="1" lang="ja-JP" altLang="en-US" smtClean="0"/>
-              <a:t>2019/11/2</a:t>
+              <a:t>2019/11/3</a:t>
             </a:fld>
             <a:endParaRPr kumimoji="1" lang="ja-JP" altLang="en-US"/>
           </a:p>
@@ -2928,7 +2930,7 @@
           <a:p>
             <a:fld id="{5A1C9A1D-F45E-4798-8D6C-555DCB791BF9}" type="datetimeFigureOut">
               <a:rPr kumimoji="1" lang="ja-JP" altLang="en-US" smtClean="0"/>
-              <a:t>2019/11/2</a:t>
+              <a:t>2019/11/3</a:t>
             </a:fld>
             <a:endParaRPr kumimoji="1" lang="ja-JP" altLang="en-US"/>
           </a:p>
@@ -3201,7 +3203,7 @@
           <a:p>
             <a:fld id="{5A1C9A1D-F45E-4798-8D6C-555DCB791BF9}" type="datetimeFigureOut">
               <a:rPr kumimoji="1" lang="ja-JP" altLang="en-US" smtClean="0"/>
-              <a:t>2019/11/2</a:t>
+              <a:t>2019/11/3</a:t>
             </a:fld>
             <a:endParaRPr kumimoji="1" lang="ja-JP" altLang="en-US"/>
           </a:p>
@@ -4213,42 +4215,6 @@
           </a:p>
         </p:txBody>
       </p:sp>
-      <p:pic>
-        <p:nvPicPr>
-          <p:cNvPr id="37" name="Picture 1">
-            <a:extLst>
-              <a:ext uri="{FF2B5EF4-FFF2-40B4-BE49-F238E27FC236}">
-                <a16:creationId xmlns:a16="http://schemas.microsoft.com/office/drawing/2014/main" id="{EE15A841-D552-4BAE-B7B8-9B45E13C5551}"/>
-              </a:ext>
-            </a:extLst>
-          </p:cNvPr>
-          <p:cNvPicPr>
-            <a:picLocks noChangeAspect="1"/>
-          </p:cNvPicPr>
-          <p:nvPr/>
-        </p:nvPicPr>
-        <p:blipFill>
-          <a:blip r:embed="rId8">
-            <a:extLst>
-              <a:ext uri="{28A0092B-C50C-407E-A947-70E740481C1C}">
-                <a14:useLocalDpi xmlns:a14="http://schemas.microsoft.com/office/drawing/2010/main" val="0"/>
-              </a:ext>
-            </a:extLst>
-          </a:blip>
-          <a:stretch>
-            <a:fillRect/>
-          </a:stretch>
-        </p:blipFill>
-        <p:spPr>
-          <a:xfrm>
-            <a:off x="6096000" y="4228328"/>
-            <a:ext cx="720000" cy="720000"/>
-          </a:xfrm>
-          <a:prstGeom prst="rect">
-            <a:avLst/>
-          </a:prstGeom>
-        </p:spPr>
-      </p:pic>
     </p:spTree>
     <p:extLst>
       <p:ext uri="{BB962C8B-B14F-4D97-AF65-F5344CB8AC3E}">
@@ -6778,6 +6744,1473 @@
     <p:extLst>
       <p:ext uri="{BB962C8B-B14F-4D97-AF65-F5344CB8AC3E}">
         <p14:creationId xmlns:p14="http://schemas.microsoft.com/office/powerpoint/2010/main" val="1229713017"/>
+      </p:ext>
+    </p:extLst>
+  </p:cSld>
+  <p:clrMapOvr>
+    <a:masterClrMapping/>
+  </p:clrMapOvr>
+</p:sld>
+</file>
+
+<file path=ppt/slides/slide6.xml><?xml version="1.0" encoding="utf-8"?>
+<p:sld xmlns:a="http://schemas.openxmlformats.org/drawingml/2006/main" xmlns:r="http://schemas.openxmlformats.org/officeDocument/2006/relationships" xmlns:p="http://schemas.openxmlformats.org/presentationml/2006/main">
+  <p:cSld>
+    <p:spTree>
+      <p:nvGrpSpPr>
+        <p:cNvPr id="1" name=""/>
+        <p:cNvGrpSpPr/>
+        <p:nvPr/>
+      </p:nvGrpSpPr>
+      <p:grpSpPr>
+        <a:xfrm>
+          <a:off x="0" y="0"/>
+          <a:ext cx="0" cy="0"/>
+          <a:chOff x="0" y="0"/>
+          <a:chExt cx="0" cy="0"/>
+        </a:xfrm>
+      </p:grpSpPr>
+      <p:pic>
+        <p:nvPicPr>
+          <p:cNvPr id="1026" name="Picture 2" descr="1">
+            <a:extLst>
+              <a:ext uri="{FF2B5EF4-FFF2-40B4-BE49-F238E27FC236}">
+                <a16:creationId xmlns:a16="http://schemas.microsoft.com/office/drawing/2014/main" id="{083E8734-22FE-4A30-AA5B-8617ECC9E797}"/>
+              </a:ext>
+            </a:extLst>
+          </p:cNvPr>
+          <p:cNvPicPr>
+            <a:picLocks noChangeAspect="1" noChangeArrowheads="1"/>
+          </p:cNvPicPr>
+          <p:nvPr/>
+        </p:nvPicPr>
+        <p:blipFill>
+          <a:blip r:embed="rId2">
+            <a:extLst>
+              <a:ext uri="{28A0092B-C50C-407E-A947-70E740481C1C}">
+                <a14:useLocalDpi xmlns:a14="http://schemas.microsoft.com/office/drawing/2010/main" val="0"/>
+              </a:ext>
+            </a:extLst>
+          </a:blip>
+          <a:srcRect/>
+          <a:stretch>
+            <a:fillRect/>
+          </a:stretch>
+        </p:blipFill>
+        <p:spPr bwMode="auto">
+          <a:xfrm>
+            <a:off x="1116362" y="1254637"/>
+            <a:ext cx="1413918" cy="1413918"/>
+          </a:xfrm>
+          <a:prstGeom prst="rect">
+            <a:avLst/>
+          </a:prstGeom>
+          <a:noFill/>
+          <a:extLst>
+            <a:ext uri="{909E8E84-426E-40DD-AFC4-6F175D3DCCD1}">
+              <a14:hiddenFill xmlns:a14="http://schemas.microsoft.com/office/drawing/2010/main">
+                <a:solidFill>
+                  <a:srgbClr val="FFFFFF"/>
+                </a:solidFill>
+              </a14:hiddenFill>
+            </a:ext>
+          </a:extLst>
+        </p:spPr>
+      </p:pic>
+      <p:sp>
+        <p:nvSpPr>
+          <p:cNvPr id="4" name="テキスト ボックス 3">
+            <a:extLst>
+              <a:ext uri="{FF2B5EF4-FFF2-40B4-BE49-F238E27FC236}">
+                <a16:creationId xmlns:a16="http://schemas.microsoft.com/office/drawing/2014/main" id="{C9FEAAB5-0C01-43F1-9FCE-1B2E8CAB57F2}"/>
+              </a:ext>
+            </a:extLst>
+          </p:cNvPr>
+          <p:cNvSpPr txBox="1"/>
+          <p:nvPr/>
+        </p:nvSpPr>
+        <p:spPr>
+          <a:xfrm>
+            <a:off x="923074" y="2850877"/>
+            <a:ext cx="1800493" cy="646331"/>
+          </a:xfrm>
+          <a:prstGeom prst="rect">
+            <a:avLst/>
+          </a:prstGeom>
+          <a:noFill/>
+        </p:spPr>
+        <p:txBody>
+          <a:bodyPr wrap="none" rtlCol="0">
+            <a:spAutoFit/>
+          </a:bodyPr>
+          <a:lstStyle/>
+          <a:p>
+            <a:pPr algn="ctr"/>
+            <a:r>
+              <a:rPr kumimoji="1" lang="ja-JP" altLang="en-US"/>
+              <a:t>絶対圧センサ</a:t>
+            </a:r>
+            <a:endParaRPr kumimoji="1" lang="en-US" altLang="ja-JP"/>
+          </a:p>
+          <a:p>
+            <a:pPr algn="ctr"/>
+            <a:r>
+              <a:rPr kumimoji="1" lang="ja-JP" altLang="en-US"/>
+              <a:t>評価モジュール</a:t>
+            </a:r>
+          </a:p>
+        </p:txBody>
+      </p:sp>
+      <p:pic>
+        <p:nvPicPr>
+          <p:cNvPr id="6" name="図 5">
+            <a:extLst>
+              <a:ext uri="{FF2B5EF4-FFF2-40B4-BE49-F238E27FC236}">
+                <a16:creationId xmlns:a16="http://schemas.microsoft.com/office/drawing/2014/main" id="{F7479735-E4FF-4692-B2BF-3F063054B08E}"/>
+              </a:ext>
+            </a:extLst>
+          </p:cNvPr>
+          <p:cNvPicPr>
+            <a:picLocks noChangeAspect="1"/>
+          </p:cNvPicPr>
+          <p:nvPr/>
+        </p:nvPicPr>
+        <p:blipFill>
+          <a:blip r:embed="rId3"/>
+          <a:stretch>
+            <a:fillRect/>
+          </a:stretch>
+        </p:blipFill>
+        <p:spPr>
+          <a:xfrm>
+            <a:off x="3554811" y="1255126"/>
+            <a:ext cx="1961010" cy="1497779"/>
+          </a:xfrm>
+          <a:prstGeom prst="rect">
+            <a:avLst/>
+          </a:prstGeom>
+        </p:spPr>
+      </p:pic>
+      <p:sp>
+        <p:nvSpPr>
+          <p:cNvPr id="7" name="テキスト ボックス 6">
+            <a:extLst>
+              <a:ext uri="{FF2B5EF4-FFF2-40B4-BE49-F238E27FC236}">
+                <a16:creationId xmlns:a16="http://schemas.microsoft.com/office/drawing/2014/main" id="{E5E70E43-CB29-4AC5-96CB-D0B647858CAB}"/>
+              </a:ext>
+            </a:extLst>
+          </p:cNvPr>
+          <p:cNvSpPr txBox="1"/>
+          <p:nvPr/>
+        </p:nvSpPr>
+        <p:spPr>
+          <a:xfrm>
+            <a:off x="3528469" y="2989376"/>
+            <a:ext cx="2013693" cy="369332"/>
+          </a:xfrm>
+          <a:prstGeom prst="rect">
+            <a:avLst/>
+          </a:prstGeom>
+          <a:noFill/>
+        </p:spPr>
+        <p:txBody>
+          <a:bodyPr wrap="none" rtlCol="0">
+            <a:spAutoFit/>
+          </a:bodyPr>
+          <a:lstStyle/>
+          <a:p>
+            <a:pPr algn="ctr"/>
+            <a:r>
+              <a:rPr kumimoji="1" lang="en-US" altLang="ja-JP"/>
+              <a:t>Wio LTE Cat.1 JP</a:t>
+            </a:r>
+            <a:endParaRPr kumimoji="1" lang="ja-JP" altLang="en-US"/>
+          </a:p>
+        </p:txBody>
+      </p:sp>
+      <p:pic>
+        <p:nvPicPr>
+          <p:cNvPr id="12" name="Picture 104">
+            <a:extLst>
+              <a:ext uri="{FF2B5EF4-FFF2-40B4-BE49-F238E27FC236}">
+                <a16:creationId xmlns:a16="http://schemas.microsoft.com/office/drawing/2014/main" id="{023A9DF5-2CE6-4F82-95B8-88BE8C240080}"/>
+              </a:ext>
+            </a:extLst>
+          </p:cNvPr>
+          <p:cNvPicPr>
+            <a:picLocks noChangeAspect="1"/>
+          </p:cNvPicPr>
+          <p:nvPr/>
+        </p:nvPicPr>
+        <p:blipFill>
+          <a:blip r:embed="rId4">
+            <a:extLst>
+              <a:ext uri="{28A0092B-C50C-407E-A947-70E740481C1C}">
+                <a14:useLocalDpi xmlns:a14="http://schemas.microsoft.com/office/drawing/2010/main" val="0"/>
+              </a:ext>
+            </a:extLst>
+          </a:blip>
+          <a:stretch>
+            <a:fillRect/>
+          </a:stretch>
+        </p:blipFill>
+        <p:spPr>
+          <a:xfrm>
+            <a:off x="4676232" y="1014946"/>
+            <a:ext cx="1005573" cy="1005573"/>
+          </a:xfrm>
+          <a:prstGeom prst="rect">
+            <a:avLst/>
+          </a:prstGeom>
+        </p:spPr>
+      </p:pic>
+      <p:pic>
+        <p:nvPicPr>
+          <p:cNvPr id="13" name="Picture 105">
+            <a:extLst>
+              <a:ext uri="{FF2B5EF4-FFF2-40B4-BE49-F238E27FC236}">
+                <a16:creationId xmlns:a16="http://schemas.microsoft.com/office/drawing/2014/main" id="{84BA2987-E615-4F8A-B087-8FCB7ADB310F}"/>
+              </a:ext>
+            </a:extLst>
+          </p:cNvPr>
+          <p:cNvPicPr>
+            <a:picLocks noChangeAspect="1"/>
+          </p:cNvPicPr>
+          <p:nvPr/>
+        </p:nvPicPr>
+        <p:blipFill>
+          <a:blip r:embed="rId5">
+            <a:extLst>
+              <a:ext uri="{28A0092B-C50C-407E-A947-70E740481C1C}">
+                <a14:useLocalDpi xmlns:a14="http://schemas.microsoft.com/office/drawing/2010/main" val="0"/>
+              </a:ext>
+            </a:extLst>
+          </a:blip>
+          <a:stretch>
+            <a:fillRect/>
+          </a:stretch>
+        </p:blipFill>
+        <p:spPr>
+          <a:xfrm>
+            <a:off x="6556592" y="1135125"/>
+            <a:ext cx="1596240" cy="1596240"/>
+          </a:xfrm>
+          <a:prstGeom prst="rect">
+            <a:avLst/>
+          </a:prstGeom>
+        </p:spPr>
+      </p:pic>
+      <p:sp>
+        <p:nvSpPr>
+          <p:cNvPr id="14" name="テキスト ボックス 13">
+            <a:extLst>
+              <a:ext uri="{FF2B5EF4-FFF2-40B4-BE49-F238E27FC236}">
+                <a16:creationId xmlns:a16="http://schemas.microsoft.com/office/drawing/2014/main" id="{47EA2411-A86B-4252-9E73-36AD4A9E72D9}"/>
+              </a:ext>
+            </a:extLst>
+          </p:cNvPr>
+          <p:cNvSpPr txBox="1"/>
+          <p:nvPr/>
+        </p:nvSpPr>
+        <p:spPr>
+          <a:xfrm>
+            <a:off x="6347064" y="2989376"/>
+            <a:ext cx="2015296" cy="369332"/>
+          </a:xfrm>
+          <a:prstGeom prst="rect">
+            <a:avLst/>
+          </a:prstGeom>
+          <a:noFill/>
+        </p:spPr>
+        <p:txBody>
+          <a:bodyPr wrap="none" rtlCol="0">
+            <a:spAutoFit/>
+          </a:bodyPr>
+          <a:lstStyle/>
+          <a:p>
+            <a:pPr algn="ctr"/>
+            <a:r>
+              <a:rPr kumimoji="1" lang="en-US" altLang="ja-JP"/>
+              <a:t>SORACOM </a:t>
+            </a:r>
+            <a:r>
+              <a:rPr lang="en-US" altLang="ja-JP"/>
+              <a:t>Beam</a:t>
+            </a:r>
+            <a:endParaRPr kumimoji="1" lang="ja-JP" altLang="en-US"/>
+          </a:p>
+        </p:txBody>
+      </p:sp>
+      <p:pic>
+        <p:nvPicPr>
+          <p:cNvPr id="16" name="Graphic 18">
+            <a:extLst>
+              <a:ext uri="{FF2B5EF4-FFF2-40B4-BE49-F238E27FC236}">
+                <a16:creationId xmlns:a16="http://schemas.microsoft.com/office/drawing/2014/main" id="{35124958-138B-42F4-AC72-5FE330E35414}"/>
+              </a:ext>
+            </a:extLst>
+          </p:cNvPr>
+          <p:cNvPicPr>
+            <a:picLocks noChangeAspect="1"/>
+          </p:cNvPicPr>
+          <p:nvPr/>
+        </p:nvPicPr>
+        <p:blipFill>
+          <a:blip r:embed="rId6">
+            <a:extLst>
+              <a:ext uri="{96DAC541-7B7A-43D3-8B79-37D633B846F1}">
+                <asvg:svgBlip xmlns:asvg="http://schemas.microsoft.com/office/drawing/2016/SVG/main" r:embed="rId7"/>
+              </a:ext>
+            </a:extLst>
+          </a:blip>
+          <a:stretch>
+            <a:fillRect/>
+          </a:stretch>
+        </p:blipFill>
+        <p:spPr>
+          <a:xfrm>
+            <a:off x="9248730" y="1326803"/>
+            <a:ext cx="1223621" cy="1223621"/>
+          </a:xfrm>
+          <a:prstGeom prst="rect">
+            <a:avLst/>
+          </a:prstGeom>
+        </p:spPr>
+      </p:pic>
+      <p:sp>
+        <p:nvSpPr>
+          <p:cNvPr id="17" name="テキスト ボックス 16">
+            <a:extLst>
+              <a:ext uri="{FF2B5EF4-FFF2-40B4-BE49-F238E27FC236}">
+                <a16:creationId xmlns:a16="http://schemas.microsoft.com/office/drawing/2014/main" id="{F55A912E-0002-4D46-8A00-3A713C1789FA}"/>
+              </a:ext>
+            </a:extLst>
+          </p:cNvPr>
+          <p:cNvSpPr txBox="1"/>
+          <p:nvPr/>
+        </p:nvSpPr>
+        <p:spPr>
+          <a:xfrm>
+            <a:off x="9027619" y="2986568"/>
+            <a:ext cx="1665842" cy="369332"/>
+          </a:xfrm>
+          <a:prstGeom prst="rect">
+            <a:avLst/>
+          </a:prstGeom>
+          <a:noFill/>
+        </p:spPr>
+        <p:txBody>
+          <a:bodyPr wrap="none" rtlCol="0">
+            <a:spAutoFit/>
+          </a:bodyPr>
+          <a:lstStyle/>
+          <a:p>
+            <a:pPr algn="ctr"/>
+            <a:r>
+              <a:rPr kumimoji="1" lang="en-US" altLang="ja-JP"/>
+              <a:t>AWS IoT Core</a:t>
+            </a:r>
+            <a:endParaRPr kumimoji="1" lang="ja-JP" altLang="en-US"/>
+          </a:p>
+        </p:txBody>
+      </p:sp>
+      <p:cxnSp>
+        <p:nvCxnSpPr>
+          <p:cNvPr id="18" name="直線矢印コネクタ 17">
+            <a:extLst>
+              <a:ext uri="{FF2B5EF4-FFF2-40B4-BE49-F238E27FC236}">
+                <a16:creationId xmlns:a16="http://schemas.microsoft.com/office/drawing/2014/main" id="{48999EC8-E71B-49D5-A779-A2764591BB83}"/>
+              </a:ext>
+            </a:extLst>
+          </p:cNvPr>
+          <p:cNvCxnSpPr>
+            <a:cxnSpLocks/>
+          </p:cNvCxnSpPr>
+          <p:nvPr/>
+        </p:nvCxnSpPr>
+        <p:spPr>
+          <a:xfrm>
+            <a:off x="2663494" y="2004015"/>
+            <a:ext cx="855436" cy="0"/>
+          </a:xfrm>
+          <a:prstGeom prst="straightConnector1">
+            <a:avLst/>
+          </a:prstGeom>
+          <a:ln w="38100" cap="rnd">
+            <a:solidFill>
+              <a:schemeClr val="bg1">
+                <a:lumMod val="50000"/>
+              </a:schemeClr>
+            </a:solidFill>
+            <a:tailEnd type="arrow"/>
+          </a:ln>
+        </p:spPr>
+        <p:style>
+          <a:lnRef idx="1">
+            <a:schemeClr val="accent1"/>
+          </a:lnRef>
+          <a:fillRef idx="0">
+            <a:schemeClr val="accent1"/>
+          </a:fillRef>
+          <a:effectRef idx="0">
+            <a:schemeClr val="accent1"/>
+          </a:effectRef>
+          <a:fontRef idx="minor">
+            <a:schemeClr val="tx1"/>
+          </a:fontRef>
+        </p:style>
+      </p:cxnSp>
+      <p:cxnSp>
+        <p:nvCxnSpPr>
+          <p:cNvPr id="23" name="直線矢印コネクタ 22">
+            <a:extLst>
+              <a:ext uri="{FF2B5EF4-FFF2-40B4-BE49-F238E27FC236}">
+                <a16:creationId xmlns:a16="http://schemas.microsoft.com/office/drawing/2014/main" id="{1561B5BC-FC24-4BC1-8B94-5D5C1130D2CC}"/>
+              </a:ext>
+            </a:extLst>
+          </p:cNvPr>
+          <p:cNvCxnSpPr>
+            <a:cxnSpLocks/>
+          </p:cNvCxnSpPr>
+          <p:nvPr/>
+        </p:nvCxnSpPr>
+        <p:spPr>
+          <a:xfrm>
+            <a:off x="5701156" y="2004015"/>
+            <a:ext cx="855436" cy="0"/>
+          </a:xfrm>
+          <a:prstGeom prst="straightConnector1">
+            <a:avLst/>
+          </a:prstGeom>
+          <a:ln w="38100" cap="rnd">
+            <a:solidFill>
+              <a:schemeClr val="bg1">
+                <a:lumMod val="50000"/>
+              </a:schemeClr>
+            </a:solidFill>
+            <a:headEnd type="arrow"/>
+            <a:tailEnd type="arrow"/>
+          </a:ln>
+        </p:spPr>
+        <p:style>
+          <a:lnRef idx="1">
+            <a:schemeClr val="accent1"/>
+          </a:lnRef>
+          <a:fillRef idx="0">
+            <a:schemeClr val="accent1"/>
+          </a:fillRef>
+          <a:effectRef idx="0">
+            <a:schemeClr val="accent1"/>
+          </a:effectRef>
+          <a:fontRef idx="minor">
+            <a:schemeClr val="tx1"/>
+          </a:fontRef>
+        </p:style>
+      </p:cxnSp>
+      <p:cxnSp>
+        <p:nvCxnSpPr>
+          <p:cNvPr id="24" name="直線矢印コネクタ 23">
+            <a:extLst>
+              <a:ext uri="{FF2B5EF4-FFF2-40B4-BE49-F238E27FC236}">
+                <a16:creationId xmlns:a16="http://schemas.microsoft.com/office/drawing/2014/main" id="{502689B5-188B-4515-BA06-80E504951D95}"/>
+              </a:ext>
+            </a:extLst>
+          </p:cNvPr>
+          <p:cNvCxnSpPr>
+            <a:cxnSpLocks/>
+          </p:cNvCxnSpPr>
+          <p:nvPr/>
+        </p:nvCxnSpPr>
+        <p:spPr>
+          <a:xfrm>
+            <a:off x="8172183" y="2004015"/>
+            <a:ext cx="855436" cy="0"/>
+          </a:xfrm>
+          <a:prstGeom prst="straightConnector1">
+            <a:avLst/>
+          </a:prstGeom>
+          <a:ln w="38100" cap="rnd">
+            <a:solidFill>
+              <a:schemeClr val="bg1">
+                <a:lumMod val="50000"/>
+              </a:schemeClr>
+            </a:solidFill>
+            <a:headEnd type="arrow"/>
+            <a:tailEnd type="arrow"/>
+          </a:ln>
+        </p:spPr>
+        <p:style>
+          <a:lnRef idx="1">
+            <a:schemeClr val="accent1"/>
+          </a:lnRef>
+          <a:fillRef idx="0">
+            <a:schemeClr val="accent1"/>
+          </a:fillRef>
+          <a:effectRef idx="0">
+            <a:schemeClr val="accent1"/>
+          </a:effectRef>
+          <a:fontRef idx="minor">
+            <a:schemeClr val="tx1"/>
+          </a:fontRef>
+        </p:style>
+      </p:cxnSp>
+      <p:sp>
+        <p:nvSpPr>
+          <p:cNvPr id="22" name="テキスト ボックス 21">
+            <a:extLst>
+              <a:ext uri="{FF2B5EF4-FFF2-40B4-BE49-F238E27FC236}">
+                <a16:creationId xmlns:a16="http://schemas.microsoft.com/office/drawing/2014/main" id="{EDB91FD3-4F14-48C5-8605-4CD947CD3BC5}"/>
+              </a:ext>
+            </a:extLst>
+          </p:cNvPr>
+          <p:cNvSpPr txBox="1"/>
+          <p:nvPr/>
+        </p:nvSpPr>
+        <p:spPr>
+          <a:xfrm>
+            <a:off x="2822548" y="1563913"/>
+            <a:ext cx="537327" cy="369332"/>
+          </a:xfrm>
+          <a:prstGeom prst="rect">
+            <a:avLst/>
+          </a:prstGeom>
+          <a:noFill/>
+        </p:spPr>
+        <p:txBody>
+          <a:bodyPr wrap="none" rtlCol="0">
+            <a:spAutoFit/>
+          </a:bodyPr>
+          <a:lstStyle/>
+          <a:p>
+            <a:pPr algn="ctr"/>
+            <a:r>
+              <a:rPr kumimoji="1" lang="en-US" altLang="ja-JP"/>
+              <a:t>I2C</a:t>
+            </a:r>
+            <a:endParaRPr kumimoji="1" lang="ja-JP" altLang="en-US"/>
+          </a:p>
+        </p:txBody>
+      </p:sp>
+      <p:sp>
+        <p:nvSpPr>
+          <p:cNvPr id="26" name="テキスト ボックス 25">
+            <a:extLst>
+              <a:ext uri="{FF2B5EF4-FFF2-40B4-BE49-F238E27FC236}">
+                <a16:creationId xmlns:a16="http://schemas.microsoft.com/office/drawing/2014/main" id="{26C4DF4F-E57C-41D8-A5F2-D7002F89A692}"/>
+              </a:ext>
+            </a:extLst>
+          </p:cNvPr>
+          <p:cNvSpPr txBox="1"/>
+          <p:nvPr/>
+        </p:nvSpPr>
+        <p:spPr>
+          <a:xfrm>
+            <a:off x="5700712" y="1563913"/>
+            <a:ext cx="856325" cy="369332"/>
+          </a:xfrm>
+          <a:prstGeom prst="rect">
+            <a:avLst/>
+          </a:prstGeom>
+          <a:noFill/>
+        </p:spPr>
+        <p:txBody>
+          <a:bodyPr wrap="none" rtlCol="0">
+            <a:spAutoFit/>
+          </a:bodyPr>
+          <a:lstStyle/>
+          <a:p>
+            <a:pPr algn="ctr"/>
+            <a:r>
+              <a:rPr kumimoji="1" lang="en-US" altLang="ja-JP"/>
+              <a:t>MQTT</a:t>
+            </a:r>
+            <a:endParaRPr kumimoji="1" lang="ja-JP" altLang="en-US"/>
+          </a:p>
+        </p:txBody>
+      </p:sp>
+      <p:sp>
+        <p:nvSpPr>
+          <p:cNvPr id="27" name="テキスト ボックス 26">
+            <a:extLst>
+              <a:ext uri="{FF2B5EF4-FFF2-40B4-BE49-F238E27FC236}">
+                <a16:creationId xmlns:a16="http://schemas.microsoft.com/office/drawing/2014/main" id="{9DB8D170-4277-483B-89AF-DF4F3A7C004E}"/>
+              </a:ext>
+            </a:extLst>
+          </p:cNvPr>
+          <p:cNvSpPr txBox="1"/>
+          <p:nvPr/>
+        </p:nvSpPr>
+        <p:spPr>
+          <a:xfrm>
+            <a:off x="8099603" y="1563913"/>
+            <a:ext cx="1000595" cy="369332"/>
+          </a:xfrm>
+          <a:prstGeom prst="rect">
+            <a:avLst/>
+          </a:prstGeom>
+          <a:noFill/>
+        </p:spPr>
+        <p:txBody>
+          <a:bodyPr wrap="none" rtlCol="0">
+            <a:spAutoFit/>
+          </a:bodyPr>
+          <a:lstStyle/>
+          <a:p>
+            <a:pPr algn="ctr"/>
+            <a:r>
+              <a:rPr kumimoji="1" lang="en-US" altLang="ja-JP"/>
+              <a:t>MQTTS</a:t>
+            </a:r>
+            <a:endParaRPr kumimoji="1" lang="ja-JP" altLang="en-US"/>
+          </a:p>
+        </p:txBody>
+      </p:sp>
+      <p:sp>
+        <p:nvSpPr>
+          <p:cNvPr id="48" name="楕円 47">
+            <a:extLst>
+              <a:ext uri="{FF2B5EF4-FFF2-40B4-BE49-F238E27FC236}">
+                <a16:creationId xmlns:a16="http://schemas.microsoft.com/office/drawing/2014/main" id="{B15819E6-84D9-4D4A-A6D9-63BBF231AD4B}"/>
+              </a:ext>
+            </a:extLst>
+          </p:cNvPr>
+          <p:cNvSpPr/>
+          <p:nvPr/>
+        </p:nvSpPr>
+        <p:spPr>
+          <a:xfrm>
+            <a:off x="10069579" y="2307828"/>
+            <a:ext cx="402772" cy="402772"/>
+          </a:xfrm>
+          <a:prstGeom prst="ellipse">
+            <a:avLst/>
+          </a:prstGeom>
+          <a:solidFill>
+            <a:srgbClr val="FF00FF"/>
+          </a:solidFill>
+          <a:ln>
+            <a:noFill/>
+          </a:ln>
+        </p:spPr>
+        <p:style>
+          <a:lnRef idx="2">
+            <a:schemeClr val="accent1">
+              <a:shade val="50000"/>
+            </a:schemeClr>
+          </a:lnRef>
+          <a:fillRef idx="1">
+            <a:schemeClr val="accent1"/>
+          </a:fillRef>
+          <a:effectRef idx="0">
+            <a:schemeClr val="accent1"/>
+          </a:effectRef>
+          <a:fontRef idx="minor">
+            <a:schemeClr val="lt1"/>
+          </a:fontRef>
+        </p:style>
+        <p:txBody>
+          <a:bodyPr wrap="none" rtlCol="0" anchor="ctr"/>
+          <a:lstStyle/>
+          <a:p>
+            <a:pPr algn="ctr"/>
+            <a:r>
+              <a:rPr lang="en-US" altLang="ja-JP" b="1"/>
+              <a:t>2</a:t>
+            </a:r>
+            <a:endParaRPr kumimoji="1" lang="ja-JP" altLang="en-US" b="1"/>
+          </a:p>
+        </p:txBody>
+      </p:sp>
+      <p:sp>
+        <p:nvSpPr>
+          <p:cNvPr id="49" name="楕円 48">
+            <a:extLst>
+              <a:ext uri="{FF2B5EF4-FFF2-40B4-BE49-F238E27FC236}">
+                <a16:creationId xmlns:a16="http://schemas.microsoft.com/office/drawing/2014/main" id="{F123D21C-9454-4490-BCEE-207E6036DBB5}"/>
+              </a:ext>
+            </a:extLst>
+          </p:cNvPr>
+          <p:cNvSpPr/>
+          <p:nvPr/>
+        </p:nvSpPr>
+        <p:spPr>
+          <a:xfrm>
+            <a:off x="10472351" y="2307828"/>
+            <a:ext cx="402772" cy="402772"/>
+          </a:xfrm>
+          <a:prstGeom prst="ellipse">
+            <a:avLst/>
+          </a:prstGeom>
+          <a:solidFill>
+            <a:srgbClr val="FF00FF"/>
+          </a:solidFill>
+          <a:ln>
+            <a:noFill/>
+          </a:ln>
+        </p:spPr>
+        <p:style>
+          <a:lnRef idx="2">
+            <a:schemeClr val="accent1">
+              <a:shade val="50000"/>
+            </a:schemeClr>
+          </a:lnRef>
+          <a:fillRef idx="1">
+            <a:schemeClr val="accent1"/>
+          </a:fillRef>
+          <a:effectRef idx="0">
+            <a:schemeClr val="accent1"/>
+          </a:effectRef>
+          <a:fontRef idx="minor">
+            <a:schemeClr val="lt1"/>
+          </a:fontRef>
+        </p:style>
+        <p:txBody>
+          <a:bodyPr wrap="none" rtlCol="0" anchor="ctr"/>
+          <a:lstStyle/>
+          <a:p>
+            <a:pPr algn="ctr"/>
+            <a:r>
+              <a:rPr lang="en-US" altLang="ja-JP" b="1"/>
+              <a:t>3</a:t>
+            </a:r>
+            <a:endParaRPr kumimoji="1" lang="ja-JP" altLang="en-US" b="1"/>
+          </a:p>
+        </p:txBody>
+      </p:sp>
+      <p:sp>
+        <p:nvSpPr>
+          <p:cNvPr id="50" name="楕円 49">
+            <a:extLst>
+              <a:ext uri="{FF2B5EF4-FFF2-40B4-BE49-F238E27FC236}">
+                <a16:creationId xmlns:a16="http://schemas.microsoft.com/office/drawing/2014/main" id="{A51CF50A-C8D8-465E-B74C-D6A92E0E4C06}"/>
+              </a:ext>
+            </a:extLst>
+          </p:cNvPr>
+          <p:cNvSpPr/>
+          <p:nvPr/>
+        </p:nvSpPr>
+        <p:spPr>
+          <a:xfrm>
+            <a:off x="10874252" y="2307828"/>
+            <a:ext cx="402772" cy="402772"/>
+          </a:xfrm>
+          <a:prstGeom prst="ellipse">
+            <a:avLst/>
+          </a:prstGeom>
+          <a:solidFill>
+            <a:srgbClr val="FF00FF"/>
+          </a:solidFill>
+          <a:ln>
+            <a:noFill/>
+          </a:ln>
+        </p:spPr>
+        <p:style>
+          <a:lnRef idx="2">
+            <a:schemeClr val="accent1">
+              <a:shade val="50000"/>
+            </a:schemeClr>
+          </a:lnRef>
+          <a:fillRef idx="1">
+            <a:schemeClr val="accent1"/>
+          </a:fillRef>
+          <a:effectRef idx="0">
+            <a:schemeClr val="accent1"/>
+          </a:effectRef>
+          <a:fontRef idx="minor">
+            <a:schemeClr val="lt1"/>
+          </a:fontRef>
+        </p:style>
+        <p:txBody>
+          <a:bodyPr wrap="none" rtlCol="0" anchor="ctr"/>
+          <a:lstStyle/>
+          <a:p>
+            <a:pPr algn="ctr"/>
+            <a:r>
+              <a:rPr lang="en-US" altLang="ja-JP" b="1"/>
+              <a:t>4</a:t>
+            </a:r>
+            <a:endParaRPr kumimoji="1" lang="ja-JP" altLang="en-US" b="1"/>
+          </a:p>
+        </p:txBody>
+      </p:sp>
+      <p:sp>
+        <p:nvSpPr>
+          <p:cNvPr id="51" name="楕円 50">
+            <a:extLst>
+              <a:ext uri="{FF2B5EF4-FFF2-40B4-BE49-F238E27FC236}">
+                <a16:creationId xmlns:a16="http://schemas.microsoft.com/office/drawing/2014/main" id="{B47FA5D2-60A3-4E59-94B2-2C112B8B6B18}"/>
+              </a:ext>
+            </a:extLst>
+          </p:cNvPr>
+          <p:cNvSpPr/>
+          <p:nvPr/>
+        </p:nvSpPr>
+        <p:spPr>
+          <a:xfrm>
+            <a:off x="6897542" y="2307828"/>
+            <a:ext cx="402772" cy="402772"/>
+          </a:xfrm>
+          <a:prstGeom prst="ellipse">
+            <a:avLst/>
+          </a:prstGeom>
+          <a:solidFill>
+            <a:srgbClr val="FF00FF"/>
+          </a:solidFill>
+          <a:ln>
+            <a:noFill/>
+          </a:ln>
+        </p:spPr>
+        <p:style>
+          <a:lnRef idx="2">
+            <a:schemeClr val="accent1">
+              <a:shade val="50000"/>
+            </a:schemeClr>
+          </a:lnRef>
+          <a:fillRef idx="1">
+            <a:schemeClr val="accent1"/>
+          </a:fillRef>
+          <a:effectRef idx="0">
+            <a:schemeClr val="accent1"/>
+          </a:effectRef>
+          <a:fontRef idx="minor">
+            <a:schemeClr val="lt1"/>
+          </a:fontRef>
+        </p:style>
+        <p:txBody>
+          <a:bodyPr wrap="none" rtlCol="0" anchor="ctr"/>
+          <a:lstStyle/>
+          <a:p>
+            <a:pPr algn="ctr"/>
+            <a:r>
+              <a:rPr lang="en-US" altLang="ja-JP" b="1"/>
+              <a:t>1</a:t>
+            </a:r>
+            <a:endParaRPr kumimoji="1" lang="ja-JP" altLang="en-US" b="1"/>
+          </a:p>
+        </p:txBody>
+      </p:sp>
+      <p:sp>
+        <p:nvSpPr>
+          <p:cNvPr id="52" name="楕円 51">
+            <a:extLst>
+              <a:ext uri="{FF2B5EF4-FFF2-40B4-BE49-F238E27FC236}">
+                <a16:creationId xmlns:a16="http://schemas.microsoft.com/office/drawing/2014/main" id="{1D10E5A8-58E4-4B1A-BC95-6329EAE83BE3}"/>
+              </a:ext>
+            </a:extLst>
+          </p:cNvPr>
+          <p:cNvSpPr/>
+          <p:nvPr/>
+        </p:nvSpPr>
+        <p:spPr>
+          <a:xfrm>
+            <a:off x="7300314" y="2307828"/>
+            <a:ext cx="402772" cy="402772"/>
+          </a:xfrm>
+          <a:prstGeom prst="ellipse">
+            <a:avLst/>
+          </a:prstGeom>
+          <a:solidFill>
+            <a:srgbClr val="FF00FF"/>
+          </a:solidFill>
+          <a:ln>
+            <a:noFill/>
+          </a:ln>
+        </p:spPr>
+        <p:style>
+          <a:lnRef idx="2">
+            <a:schemeClr val="accent1">
+              <a:shade val="50000"/>
+            </a:schemeClr>
+          </a:lnRef>
+          <a:fillRef idx="1">
+            <a:schemeClr val="accent1"/>
+          </a:fillRef>
+          <a:effectRef idx="0">
+            <a:schemeClr val="accent1"/>
+          </a:effectRef>
+          <a:fontRef idx="minor">
+            <a:schemeClr val="lt1"/>
+          </a:fontRef>
+        </p:style>
+        <p:txBody>
+          <a:bodyPr wrap="none" rtlCol="0" anchor="ctr"/>
+          <a:lstStyle/>
+          <a:p>
+            <a:pPr algn="ctr"/>
+            <a:r>
+              <a:rPr lang="en-US" altLang="ja-JP" b="1"/>
+              <a:t>5</a:t>
+            </a:r>
+            <a:endParaRPr kumimoji="1" lang="ja-JP" altLang="en-US" b="1"/>
+          </a:p>
+        </p:txBody>
+      </p:sp>
+      <p:sp>
+        <p:nvSpPr>
+          <p:cNvPr id="53" name="楕円 52">
+            <a:extLst>
+              <a:ext uri="{FF2B5EF4-FFF2-40B4-BE49-F238E27FC236}">
+                <a16:creationId xmlns:a16="http://schemas.microsoft.com/office/drawing/2014/main" id="{13453DB3-4EFE-4DE5-AE49-62DCA17D2579}"/>
+              </a:ext>
+            </a:extLst>
+          </p:cNvPr>
+          <p:cNvSpPr/>
+          <p:nvPr/>
+        </p:nvSpPr>
+        <p:spPr>
+          <a:xfrm>
+            <a:off x="7702215" y="2307828"/>
+            <a:ext cx="402772" cy="402772"/>
+          </a:xfrm>
+          <a:prstGeom prst="ellipse">
+            <a:avLst/>
+          </a:prstGeom>
+          <a:solidFill>
+            <a:srgbClr val="FF00FF"/>
+          </a:solidFill>
+          <a:ln>
+            <a:noFill/>
+          </a:ln>
+        </p:spPr>
+        <p:style>
+          <a:lnRef idx="2">
+            <a:schemeClr val="accent1">
+              <a:shade val="50000"/>
+            </a:schemeClr>
+          </a:lnRef>
+          <a:fillRef idx="1">
+            <a:schemeClr val="accent1"/>
+          </a:fillRef>
+          <a:effectRef idx="0">
+            <a:schemeClr val="accent1"/>
+          </a:effectRef>
+          <a:fontRef idx="minor">
+            <a:schemeClr val="lt1"/>
+          </a:fontRef>
+        </p:style>
+        <p:txBody>
+          <a:bodyPr wrap="none" rtlCol="0" anchor="ctr"/>
+          <a:lstStyle/>
+          <a:p>
+            <a:pPr algn="ctr"/>
+            <a:r>
+              <a:rPr lang="en-US" altLang="ja-JP" b="1"/>
+              <a:t>6</a:t>
+            </a:r>
+            <a:endParaRPr kumimoji="1" lang="ja-JP" altLang="en-US" b="1"/>
+          </a:p>
+        </p:txBody>
+      </p:sp>
+      <p:sp>
+        <p:nvSpPr>
+          <p:cNvPr id="54" name="楕円 53">
+            <a:extLst>
+              <a:ext uri="{FF2B5EF4-FFF2-40B4-BE49-F238E27FC236}">
+                <a16:creationId xmlns:a16="http://schemas.microsoft.com/office/drawing/2014/main" id="{4F69A2F7-179B-4632-86DA-FFD700A3FE12}"/>
+              </a:ext>
+            </a:extLst>
+          </p:cNvPr>
+          <p:cNvSpPr/>
+          <p:nvPr/>
+        </p:nvSpPr>
+        <p:spPr>
+          <a:xfrm>
+            <a:off x="4977632" y="2307828"/>
+            <a:ext cx="402772" cy="402772"/>
+          </a:xfrm>
+          <a:prstGeom prst="ellipse">
+            <a:avLst/>
+          </a:prstGeom>
+          <a:solidFill>
+            <a:srgbClr val="FF00FF"/>
+          </a:solidFill>
+          <a:ln>
+            <a:noFill/>
+          </a:ln>
+        </p:spPr>
+        <p:style>
+          <a:lnRef idx="2">
+            <a:schemeClr val="accent1">
+              <a:shade val="50000"/>
+            </a:schemeClr>
+          </a:lnRef>
+          <a:fillRef idx="1">
+            <a:schemeClr val="accent1"/>
+          </a:fillRef>
+          <a:effectRef idx="0">
+            <a:schemeClr val="accent1"/>
+          </a:effectRef>
+          <a:fontRef idx="minor">
+            <a:schemeClr val="lt1"/>
+          </a:fontRef>
+        </p:style>
+        <p:txBody>
+          <a:bodyPr wrap="none" rtlCol="0" anchor="ctr"/>
+          <a:lstStyle/>
+          <a:p>
+            <a:pPr algn="ctr"/>
+            <a:r>
+              <a:rPr lang="en-US" altLang="ja-JP" b="1"/>
+              <a:t>7</a:t>
+            </a:r>
+            <a:endParaRPr kumimoji="1" lang="ja-JP" altLang="en-US" b="1"/>
+          </a:p>
+        </p:txBody>
+      </p:sp>
+      <p:sp>
+        <p:nvSpPr>
+          <p:cNvPr id="55" name="楕円 54">
+            <a:extLst>
+              <a:ext uri="{FF2B5EF4-FFF2-40B4-BE49-F238E27FC236}">
+                <a16:creationId xmlns:a16="http://schemas.microsoft.com/office/drawing/2014/main" id="{F1701D9E-51C8-4005-BE66-124B4E5BFD3F}"/>
+              </a:ext>
+            </a:extLst>
+          </p:cNvPr>
+          <p:cNvSpPr/>
+          <p:nvPr/>
+        </p:nvSpPr>
+        <p:spPr>
+          <a:xfrm>
+            <a:off x="11277024" y="2307828"/>
+            <a:ext cx="402772" cy="402772"/>
+          </a:xfrm>
+          <a:prstGeom prst="ellipse">
+            <a:avLst/>
+          </a:prstGeom>
+          <a:solidFill>
+            <a:srgbClr val="FF00FF"/>
+          </a:solidFill>
+          <a:ln>
+            <a:noFill/>
+          </a:ln>
+        </p:spPr>
+        <p:style>
+          <a:lnRef idx="2">
+            <a:schemeClr val="accent1">
+              <a:shade val="50000"/>
+            </a:schemeClr>
+          </a:lnRef>
+          <a:fillRef idx="1">
+            <a:schemeClr val="accent1"/>
+          </a:fillRef>
+          <a:effectRef idx="0">
+            <a:schemeClr val="accent1"/>
+          </a:effectRef>
+          <a:fontRef idx="minor">
+            <a:schemeClr val="lt1"/>
+          </a:fontRef>
+        </p:style>
+        <p:txBody>
+          <a:bodyPr wrap="none" rtlCol="0" anchor="ctr"/>
+          <a:lstStyle/>
+          <a:p>
+            <a:pPr algn="ctr"/>
+            <a:r>
+              <a:rPr lang="en-US" altLang="ja-JP" b="1"/>
+              <a:t>8</a:t>
+            </a:r>
+            <a:endParaRPr kumimoji="1" lang="ja-JP" altLang="en-US" b="1"/>
+          </a:p>
+        </p:txBody>
+      </p:sp>
+    </p:spTree>
+    <p:extLst>
+      <p:ext uri="{BB962C8B-B14F-4D97-AF65-F5344CB8AC3E}">
+        <p14:creationId xmlns:p14="http://schemas.microsoft.com/office/powerpoint/2010/main" val="2795695358"/>
+      </p:ext>
+    </p:extLst>
+  </p:cSld>
+  <p:clrMapOvr>
+    <a:masterClrMapping/>
+  </p:clrMapOvr>
+</p:sld>
+</file>
+
+<file path=ppt/slides/slide7.xml><?xml version="1.0" encoding="utf-8"?>
+<p:sld xmlns:a="http://schemas.openxmlformats.org/drawingml/2006/main" xmlns:r="http://schemas.openxmlformats.org/officeDocument/2006/relationships" xmlns:p="http://schemas.openxmlformats.org/presentationml/2006/main">
+  <p:cSld>
+    <p:spTree>
+      <p:nvGrpSpPr>
+        <p:cNvPr id="1" name=""/>
+        <p:cNvGrpSpPr/>
+        <p:nvPr/>
+      </p:nvGrpSpPr>
+      <p:grpSpPr>
+        <a:xfrm>
+          <a:off x="0" y="0"/>
+          <a:ext cx="0" cy="0"/>
+          <a:chOff x="0" y="0"/>
+          <a:chExt cx="0" cy="0"/>
+        </a:xfrm>
+      </p:grpSpPr>
+      <p:sp>
+        <p:nvSpPr>
+          <p:cNvPr id="3" name="正方形/長方形 2">
+            <a:extLst>
+              <a:ext uri="{FF2B5EF4-FFF2-40B4-BE49-F238E27FC236}">
+                <a16:creationId xmlns:a16="http://schemas.microsoft.com/office/drawing/2014/main" id="{FB5FD8FC-75E7-4C82-A1AF-E2DEBAC3EDAA}"/>
+              </a:ext>
+            </a:extLst>
+          </p:cNvPr>
+          <p:cNvSpPr/>
+          <p:nvPr/>
+        </p:nvSpPr>
+        <p:spPr>
+          <a:xfrm>
+            <a:off x="6602138" y="2283899"/>
+            <a:ext cx="1929465" cy="599812"/>
+          </a:xfrm>
+          <a:prstGeom prst="rect">
+            <a:avLst/>
+          </a:prstGeom>
+          <a:solidFill>
+            <a:schemeClr val="accent6"/>
+          </a:solidFill>
+          <a:ln>
+            <a:noFill/>
+          </a:ln>
+        </p:spPr>
+        <p:style>
+          <a:lnRef idx="2">
+            <a:schemeClr val="accent1">
+              <a:shade val="50000"/>
+            </a:schemeClr>
+          </a:lnRef>
+          <a:fillRef idx="1">
+            <a:schemeClr val="accent1"/>
+          </a:fillRef>
+          <a:effectRef idx="0">
+            <a:schemeClr val="accent1"/>
+          </a:effectRef>
+          <a:fontRef idx="minor">
+            <a:schemeClr val="lt1"/>
+          </a:fontRef>
+        </p:style>
+        <p:txBody>
+          <a:bodyPr rtlCol="0" anchor="ctr"/>
+          <a:lstStyle/>
+          <a:p>
+            <a:pPr algn="ctr"/>
+            <a:r>
+              <a:rPr lang="ja-JP" altLang="en-US" sz="1400"/>
+              <a:t>ポリシー</a:t>
+            </a:r>
+            <a:endParaRPr lang="en-US" altLang="ja-JP" sz="1400"/>
+          </a:p>
+          <a:p>
+            <a:pPr algn="ctr"/>
+            <a:r>
+              <a:rPr lang="en-US" altLang="ja-JP" sz="1400"/>
+              <a:t>‘AllAcessPolicy’</a:t>
+            </a:r>
+            <a:endParaRPr kumimoji="1" lang="ja-JP" altLang="en-US" sz="1400"/>
+          </a:p>
+        </p:txBody>
+      </p:sp>
+      <p:sp>
+        <p:nvSpPr>
+          <p:cNvPr id="4" name="正方形/長方形 3">
+            <a:extLst>
+              <a:ext uri="{FF2B5EF4-FFF2-40B4-BE49-F238E27FC236}">
+                <a16:creationId xmlns:a16="http://schemas.microsoft.com/office/drawing/2014/main" id="{EFE42412-1287-40FD-BC0B-8C1D2C26A87C}"/>
+              </a:ext>
+            </a:extLst>
+          </p:cNvPr>
+          <p:cNvSpPr/>
+          <p:nvPr/>
+        </p:nvSpPr>
+        <p:spPr>
+          <a:xfrm>
+            <a:off x="3584893" y="1384181"/>
+            <a:ext cx="1929465" cy="599812"/>
+          </a:xfrm>
+          <a:prstGeom prst="rect">
+            <a:avLst/>
+          </a:prstGeom>
+          <a:solidFill>
+            <a:schemeClr val="tx1">
+              <a:lumMod val="75000"/>
+              <a:lumOff val="25000"/>
+            </a:schemeClr>
+          </a:solidFill>
+          <a:ln>
+            <a:noFill/>
+          </a:ln>
+        </p:spPr>
+        <p:style>
+          <a:lnRef idx="2">
+            <a:schemeClr val="accent1">
+              <a:shade val="50000"/>
+            </a:schemeClr>
+          </a:lnRef>
+          <a:fillRef idx="1">
+            <a:schemeClr val="accent1"/>
+          </a:fillRef>
+          <a:effectRef idx="0">
+            <a:schemeClr val="accent1"/>
+          </a:effectRef>
+          <a:fontRef idx="minor">
+            <a:schemeClr val="lt1"/>
+          </a:fontRef>
+        </p:style>
+        <p:txBody>
+          <a:bodyPr rtlCol="0" anchor="ctr"/>
+          <a:lstStyle/>
+          <a:p>
+            <a:pPr algn="ctr"/>
+            <a:r>
+              <a:rPr lang="ja-JP" altLang="en-US" sz="1400"/>
+              <a:t>クライアント</a:t>
+            </a:r>
+            <a:endParaRPr lang="en-US" altLang="ja-JP" sz="1400"/>
+          </a:p>
+          <a:p>
+            <a:pPr algn="ctr"/>
+            <a:r>
+              <a:rPr lang="ja-JP" altLang="en-US" sz="1400"/>
+              <a:t>証明書</a:t>
+            </a:r>
+            <a:endParaRPr kumimoji="1" lang="ja-JP" altLang="en-US" sz="1400"/>
+          </a:p>
+        </p:txBody>
+      </p:sp>
+      <p:sp>
+        <p:nvSpPr>
+          <p:cNvPr id="5" name="正方形/長方形 4">
+            <a:extLst>
+              <a:ext uri="{FF2B5EF4-FFF2-40B4-BE49-F238E27FC236}">
+                <a16:creationId xmlns:a16="http://schemas.microsoft.com/office/drawing/2014/main" id="{170A6467-EE65-4ED5-92D0-FDA22F19E8BF}"/>
+              </a:ext>
+            </a:extLst>
+          </p:cNvPr>
+          <p:cNvSpPr/>
+          <p:nvPr/>
+        </p:nvSpPr>
+        <p:spPr>
+          <a:xfrm>
+            <a:off x="6602138" y="1384181"/>
+            <a:ext cx="1929465" cy="599812"/>
+          </a:xfrm>
+          <a:prstGeom prst="rect">
+            <a:avLst/>
+          </a:prstGeom>
+          <a:solidFill>
+            <a:srgbClr val="E56969"/>
+          </a:solidFill>
+          <a:ln>
+            <a:noFill/>
+          </a:ln>
+        </p:spPr>
+        <p:style>
+          <a:lnRef idx="2">
+            <a:schemeClr val="accent1">
+              <a:shade val="50000"/>
+            </a:schemeClr>
+          </a:lnRef>
+          <a:fillRef idx="1">
+            <a:schemeClr val="accent1"/>
+          </a:fillRef>
+          <a:effectRef idx="0">
+            <a:schemeClr val="accent1"/>
+          </a:effectRef>
+          <a:fontRef idx="minor">
+            <a:schemeClr val="lt1"/>
+          </a:fontRef>
+        </p:style>
+        <p:txBody>
+          <a:bodyPr rtlCol="0" anchor="ctr"/>
+          <a:lstStyle/>
+          <a:p>
+            <a:pPr algn="ctr"/>
+            <a:r>
+              <a:rPr kumimoji="1" lang="ja-JP" altLang="en-US" sz="1400"/>
+              <a:t>モノ</a:t>
+            </a:r>
+            <a:endParaRPr kumimoji="1" lang="en-US" altLang="ja-JP" sz="1400"/>
+          </a:p>
+          <a:p>
+            <a:pPr algn="ctr"/>
+            <a:r>
+              <a:rPr lang="en-US" altLang="ja-JP" sz="1400"/>
+              <a:t>‘BaroDevice1’</a:t>
+            </a:r>
+            <a:endParaRPr kumimoji="1" lang="ja-JP" altLang="en-US" sz="1400"/>
+          </a:p>
+        </p:txBody>
+      </p:sp>
+      <p:sp>
+        <p:nvSpPr>
+          <p:cNvPr id="6" name="正方形/長方形 5">
+            <a:extLst>
+              <a:ext uri="{FF2B5EF4-FFF2-40B4-BE49-F238E27FC236}">
+                <a16:creationId xmlns:a16="http://schemas.microsoft.com/office/drawing/2014/main" id="{154A9762-9D55-420A-9DED-FA7DC012E185}"/>
+              </a:ext>
+            </a:extLst>
+          </p:cNvPr>
+          <p:cNvSpPr/>
+          <p:nvPr/>
+        </p:nvSpPr>
+        <p:spPr>
+          <a:xfrm>
+            <a:off x="3584892" y="2042830"/>
+            <a:ext cx="1929465" cy="599812"/>
+          </a:xfrm>
+          <a:prstGeom prst="rect">
+            <a:avLst/>
+          </a:prstGeom>
+          <a:solidFill>
+            <a:schemeClr val="tx1">
+              <a:lumMod val="75000"/>
+              <a:lumOff val="25000"/>
+            </a:schemeClr>
+          </a:solidFill>
+          <a:ln>
+            <a:noFill/>
+          </a:ln>
+        </p:spPr>
+        <p:style>
+          <a:lnRef idx="2">
+            <a:schemeClr val="accent1">
+              <a:shade val="50000"/>
+            </a:schemeClr>
+          </a:lnRef>
+          <a:fillRef idx="1">
+            <a:schemeClr val="accent1"/>
+          </a:fillRef>
+          <a:effectRef idx="0">
+            <a:schemeClr val="accent1"/>
+          </a:effectRef>
+          <a:fontRef idx="minor">
+            <a:schemeClr val="lt1"/>
+          </a:fontRef>
+        </p:style>
+        <p:txBody>
+          <a:bodyPr rtlCol="0" anchor="ctr"/>
+          <a:lstStyle/>
+          <a:p>
+            <a:pPr algn="ctr"/>
+            <a:r>
+              <a:rPr kumimoji="1" lang="ja-JP" altLang="en-US" sz="1400"/>
+              <a:t>プライベート</a:t>
+            </a:r>
+            <a:endParaRPr kumimoji="1" lang="en-US" altLang="ja-JP" sz="1400"/>
+          </a:p>
+          <a:p>
+            <a:pPr algn="ctr"/>
+            <a:r>
+              <a:rPr lang="ja-JP" altLang="en-US" sz="1400"/>
+              <a:t>キー</a:t>
+            </a:r>
+            <a:endParaRPr kumimoji="1" lang="ja-JP" altLang="en-US" sz="1400"/>
+          </a:p>
+        </p:txBody>
+      </p:sp>
+      <p:cxnSp>
+        <p:nvCxnSpPr>
+          <p:cNvPr id="8" name="コネクタ: カギ線 7">
+            <a:extLst>
+              <a:ext uri="{FF2B5EF4-FFF2-40B4-BE49-F238E27FC236}">
+                <a16:creationId xmlns:a16="http://schemas.microsoft.com/office/drawing/2014/main" id="{9BEDD3C2-AA87-4259-A141-52EF4DADB6E3}"/>
+              </a:ext>
+            </a:extLst>
+          </p:cNvPr>
+          <p:cNvCxnSpPr>
+            <a:cxnSpLocks/>
+            <a:stCxn id="4" idx="3"/>
+            <a:endCxn id="5" idx="1"/>
+          </p:cNvCxnSpPr>
+          <p:nvPr/>
+        </p:nvCxnSpPr>
+        <p:spPr>
+          <a:xfrm>
+            <a:off x="5514358" y="1684087"/>
+            <a:ext cx="1087780" cy="0"/>
+          </a:xfrm>
+          <a:prstGeom prst="straightConnector1">
+            <a:avLst/>
+          </a:prstGeom>
+          <a:ln w="38100" cap="rnd">
+            <a:solidFill>
+              <a:schemeClr val="bg1">
+                <a:lumMod val="50000"/>
+              </a:schemeClr>
+            </a:solidFill>
+            <a:round/>
+            <a:headEnd type="none"/>
+            <a:tailEnd type="arrow"/>
+          </a:ln>
+        </p:spPr>
+        <p:style>
+          <a:lnRef idx="1">
+            <a:schemeClr val="accent1"/>
+          </a:lnRef>
+          <a:fillRef idx="0">
+            <a:schemeClr val="accent1"/>
+          </a:fillRef>
+          <a:effectRef idx="0">
+            <a:schemeClr val="accent1"/>
+          </a:effectRef>
+          <a:fontRef idx="minor">
+            <a:schemeClr val="tx1"/>
+          </a:fontRef>
+        </p:style>
+      </p:cxnSp>
+      <p:cxnSp>
+        <p:nvCxnSpPr>
+          <p:cNvPr id="11" name="コネクタ: カギ線 10">
+            <a:extLst>
+              <a:ext uri="{FF2B5EF4-FFF2-40B4-BE49-F238E27FC236}">
+                <a16:creationId xmlns:a16="http://schemas.microsoft.com/office/drawing/2014/main" id="{B3D7930D-FC86-46BD-A492-AECEBD86C778}"/>
+              </a:ext>
+            </a:extLst>
+          </p:cNvPr>
+          <p:cNvCxnSpPr>
+            <a:cxnSpLocks/>
+            <a:stCxn id="4" idx="3"/>
+            <a:endCxn id="3" idx="1"/>
+          </p:cNvCxnSpPr>
+          <p:nvPr/>
+        </p:nvCxnSpPr>
+        <p:spPr>
+          <a:xfrm>
+            <a:off x="5514358" y="1684087"/>
+            <a:ext cx="1087780" cy="899718"/>
+          </a:xfrm>
+          <a:prstGeom prst="bentConnector3">
+            <a:avLst>
+              <a:gd name="adj1" fmla="val 50000"/>
+            </a:avLst>
+          </a:prstGeom>
+          <a:ln w="38100" cap="rnd">
+            <a:solidFill>
+              <a:schemeClr val="bg1">
+                <a:lumMod val="50000"/>
+              </a:schemeClr>
+            </a:solidFill>
+            <a:round/>
+            <a:headEnd type="none"/>
+            <a:tailEnd type="arrow"/>
+          </a:ln>
+        </p:spPr>
+        <p:style>
+          <a:lnRef idx="1">
+            <a:schemeClr val="accent1"/>
+          </a:lnRef>
+          <a:fillRef idx="0">
+            <a:schemeClr val="accent1"/>
+          </a:fillRef>
+          <a:effectRef idx="0">
+            <a:schemeClr val="accent1"/>
+          </a:effectRef>
+          <a:fontRef idx="minor">
+            <a:schemeClr val="tx1"/>
+          </a:fontRef>
+        </p:style>
+      </p:cxnSp>
+    </p:spTree>
+    <p:extLst>
+      <p:ext uri="{BB962C8B-B14F-4D97-AF65-F5344CB8AC3E}">
+        <p14:creationId xmlns:p14="http://schemas.microsoft.com/office/powerpoint/2010/main" val="2370756951"/>
       </p:ext>
     </p:extLst>
   </p:cSld>

</xml_diff>

<commit_message>
Add section 3 of handson3
</commit_message>
<xml_diff>
--- a/handson3/media/figure.pptx
+++ b/handson3/media/figure.pptx
@@ -12,6 +12,7 @@
     <p:sldId id="260" r:id="rId6"/>
     <p:sldId id="262" r:id="rId7"/>
     <p:sldId id="261" r:id="rId8"/>
+    <p:sldId id="263" r:id="rId9"/>
   </p:sldIdLst>
   <p:sldSz cx="12192000" cy="6858000"/>
   <p:notesSz cx="6858000" cy="9144000"/>
@@ -8220,6 +8221,805 @@
 </p:sld>
 </file>
 
+<file path=ppt/slides/slide8.xml><?xml version="1.0" encoding="utf-8"?>
+<p:sld xmlns:a="http://schemas.openxmlformats.org/drawingml/2006/main" xmlns:r="http://schemas.openxmlformats.org/officeDocument/2006/relationships" xmlns:p="http://schemas.openxmlformats.org/presentationml/2006/main">
+  <p:cSld>
+    <p:spTree>
+      <p:nvGrpSpPr>
+        <p:cNvPr id="1" name=""/>
+        <p:cNvGrpSpPr/>
+        <p:nvPr/>
+      </p:nvGrpSpPr>
+      <p:grpSpPr>
+        <a:xfrm>
+          <a:off x="0" y="0"/>
+          <a:ext cx="0" cy="0"/>
+          <a:chOff x="0" y="0"/>
+          <a:chExt cx="0" cy="0"/>
+        </a:xfrm>
+      </p:grpSpPr>
+      <p:pic>
+        <p:nvPicPr>
+          <p:cNvPr id="1026" name="Picture 2" descr="1">
+            <a:extLst>
+              <a:ext uri="{FF2B5EF4-FFF2-40B4-BE49-F238E27FC236}">
+                <a16:creationId xmlns:a16="http://schemas.microsoft.com/office/drawing/2014/main" id="{083E8734-22FE-4A30-AA5B-8617ECC9E797}"/>
+              </a:ext>
+            </a:extLst>
+          </p:cNvPr>
+          <p:cNvPicPr>
+            <a:picLocks noChangeAspect="1" noChangeArrowheads="1"/>
+          </p:cNvPicPr>
+          <p:nvPr/>
+        </p:nvPicPr>
+        <p:blipFill>
+          <a:blip r:embed="rId2">
+            <a:extLst>
+              <a:ext uri="{28A0092B-C50C-407E-A947-70E740481C1C}">
+                <a14:useLocalDpi xmlns:a14="http://schemas.microsoft.com/office/drawing/2010/main" val="0"/>
+              </a:ext>
+            </a:extLst>
+          </a:blip>
+          <a:srcRect/>
+          <a:stretch>
+            <a:fillRect/>
+          </a:stretch>
+        </p:blipFill>
+        <p:spPr bwMode="auto">
+          <a:xfrm>
+            <a:off x="1116362" y="1254637"/>
+            <a:ext cx="1413918" cy="1413918"/>
+          </a:xfrm>
+          <a:prstGeom prst="rect">
+            <a:avLst/>
+          </a:prstGeom>
+          <a:noFill/>
+          <a:extLst>
+            <a:ext uri="{909E8E84-426E-40DD-AFC4-6F175D3DCCD1}">
+              <a14:hiddenFill xmlns:a14="http://schemas.microsoft.com/office/drawing/2010/main">
+                <a:solidFill>
+                  <a:srgbClr val="FFFFFF"/>
+                </a:solidFill>
+              </a14:hiddenFill>
+            </a:ext>
+          </a:extLst>
+        </p:spPr>
+      </p:pic>
+      <p:sp>
+        <p:nvSpPr>
+          <p:cNvPr id="4" name="テキスト ボックス 3">
+            <a:extLst>
+              <a:ext uri="{FF2B5EF4-FFF2-40B4-BE49-F238E27FC236}">
+                <a16:creationId xmlns:a16="http://schemas.microsoft.com/office/drawing/2014/main" id="{C9FEAAB5-0C01-43F1-9FCE-1B2E8CAB57F2}"/>
+              </a:ext>
+            </a:extLst>
+          </p:cNvPr>
+          <p:cNvSpPr txBox="1"/>
+          <p:nvPr/>
+        </p:nvSpPr>
+        <p:spPr>
+          <a:xfrm>
+            <a:off x="923074" y="2850877"/>
+            <a:ext cx="1800493" cy="646331"/>
+          </a:xfrm>
+          <a:prstGeom prst="rect">
+            <a:avLst/>
+          </a:prstGeom>
+          <a:noFill/>
+        </p:spPr>
+        <p:txBody>
+          <a:bodyPr wrap="none" rtlCol="0">
+            <a:spAutoFit/>
+          </a:bodyPr>
+          <a:lstStyle/>
+          <a:p>
+            <a:pPr algn="ctr"/>
+            <a:r>
+              <a:rPr kumimoji="1" lang="ja-JP" altLang="en-US"/>
+              <a:t>絶対圧センサ</a:t>
+            </a:r>
+            <a:endParaRPr kumimoji="1" lang="en-US" altLang="ja-JP"/>
+          </a:p>
+          <a:p>
+            <a:pPr algn="ctr"/>
+            <a:r>
+              <a:rPr kumimoji="1" lang="ja-JP" altLang="en-US"/>
+              <a:t>評価モジュール</a:t>
+            </a:r>
+          </a:p>
+        </p:txBody>
+      </p:sp>
+      <p:pic>
+        <p:nvPicPr>
+          <p:cNvPr id="6" name="図 5">
+            <a:extLst>
+              <a:ext uri="{FF2B5EF4-FFF2-40B4-BE49-F238E27FC236}">
+                <a16:creationId xmlns:a16="http://schemas.microsoft.com/office/drawing/2014/main" id="{F7479735-E4FF-4692-B2BF-3F063054B08E}"/>
+              </a:ext>
+            </a:extLst>
+          </p:cNvPr>
+          <p:cNvPicPr>
+            <a:picLocks noChangeAspect="1"/>
+          </p:cNvPicPr>
+          <p:nvPr/>
+        </p:nvPicPr>
+        <p:blipFill>
+          <a:blip r:embed="rId3"/>
+          <a:stretch>
+            <a:fillRect/>
+          </a:stretch>
+        </p:blipFill>
+        <p:spPr>
+          <a:xfrm>
+            <a:off x="3554811" y="1255126"/>
+            <a:ext cx="1961010" cy="1497779"/>
+          </a:xfrm>
+          <a:prstGeom prst="rect">
+            <a:avLst/>
+          </a:prstGeom>
+        </p:spPr>
+      </p:pic>
+      <p:sp>
+        <p:nvSpPr>
+          <p:cNvPr id="7" name="テキスト ボックス 6">
+            <a:extLst>
+              <a:ext uri="{FF2B5EF4-FFF2-40B4-BE49-F238E27FC236}">
+                <a16:creationId xmlns:a16="http://schemas.microsoft.com/office/drawing/2014/main" id="{E5E70E43-CB29-4AC5-96CB-D0B647858CAB}"/>
+              </a:ext>
+            </a:extLst>
+          </p:cNvPr>
+          <p:cNvSpPr txBox="1"/>
+          <p:nvPr/>
+        </p:nvSpPr>
+        <p:spPr>
+          <a:xfrm>
+            <a:off x="3528469" y="2989376"/>
+            <a:ext cx="2013693" cy="369332"/>
+          </a:xfrm>
+          <a:prstGeom prst="rect">
+            <a:avLst/>
+          </a:prstGeom>
+          <a:noFill/>
+        </p:spPr>
+        <p:txBody>
+          <a:bodyPr wrap="none" rtlCol="0">
+            <a:spAutoFit/>
+          </a:bodyPr>
+          <a:lstStyle/>
+          <a:p>
+            <a:pPr algn="ctr"/>
+            <a:r>
+              <a:rPr kumimoji="1" lang="en-US" altLang="ja-JP"/>
+              <a:t>Wio LTE Cat.1 JP</a:t>
+            </a:r>
+            <a:endParaRPr kumimoji="1" lang="ja-JP" altLang="en-US"/>
+          </a:p>
+        </p:txBody>
+      </p:sp>
+      <p:pic>
+        <p:nvPicPr>
+          <p:cNvPr id="12" name="Picture 104">
+            <a:extLst>
+              <a:ext uri="{FF2B5EF4-FFF2-40B4-BE49-F238E27FC236}">
+                <a16:creationId xmlns:a16="http://schemas.microsoft.com/office/drawing/2014/main" id="{023A9DF5-2CE6-4F82-95B8-88BE8C240080}"/>
+              </a:ext>
+            </a:extLst>
+          </p:cNvPr>
+          <p:cNvPicPr>
+            <a:picLocks noChangeAspect="1"/>
+          </p:cNvPicPr>
+          <p:nvPr/>
+        </p:nvPicPr>
+        <p:blipFill>
+          <a:blip r:embed="rId4">
+            <a:extLst>
+              <a:ext uri="{28A0092B-C50C-407E-A947-70E740481C1C}">
+                <a14:useLocalDpi xmlns:a14="http://schemas.microsoft.com/office/drawing/2010/main" val="0"/>
+              </a:ext>
+            </a:extLst>
+          </a:blip>
+          <a:stretch>
+            <a:fillRect/>
+          </a:stretch>
+        </p:blipFill>
+        <p:spPr>
+          <a:xfrm>
+            <a:off x="4676232" y="1014946"/>
+            <a:ext cx="1005573" cy="1005573"/>
+          </a:xfrm>
+          <a:prstGeom prst="rect">
+            <a:avLst/>
+          </a:prstGeom>
+        </p:spPr>
+      </p:pic>
+      <p:pic>
+        <p:nvPicPr>
+          <p:cNvPr id="13" name="Picture 105">
+            <a:extLst>
+              <a:ext uri="{FF2B5EF4-FFF2-40B4-BE49-F238E27FC236}">
+                <a16:creationId xmlns:a16="http://schemas.microsoft.com/office/drawing/2014/main" id="{84BA2987-E615-4F8A-B087-8FCB7ADB310F}"/>
+              </a:ext>
+            </a:extLst>
+          </p:cNvPr>
+          <p:cNvPicPr>
+            <a:picLocks noChangeAspect="1"/>
+          </p:cNvPicPr>
+          <p:nvPr/>
+        </p:nvPicPr>
+        <p:blipFill>
+          <a:blip r:embed="rId5">
+            <a:extLst>
+              <a:ext uri="{28A0092B-C50C-407E-A947-70E740481C1C}">
+                <a14:useLocalDpi xmlns:a14="http://schemas.microsoft.com/office/drawing/2010/main" val="0"/>
+              </a:ext>
+            </a:extLst>
+          </a:blip>
+          <a:stretch>
+            <a:fillRect/>
+          </a:stretch>
+        </p:blipFill>
+        <p:spPr>
+          <a:xfrm>
+            <a:off x="6556592" y="1135125"/>
+            <a:ext cx="1596240" cy="1596240"/>
+          </a:xfrm>
+          <a:prstGeom prst="rect">
+            <a:avLst/>
+          </a:prstGeom>
+        </p:spPr>
+      </p:pic>
+      <p:sp>
+        <p:nvSpPr>
+          <p:cNvPr id="14" name="テキスト ボックス 13">
+            <a:extLst>
+              <a:ext uri="{FF2B5EF4-FFF2-40B4-BE49-F238E27FC236}">
+                <a16:creationId xmlns:a16="http://schemas.microsoft.com/office/drawing/2014/main" id="{47EA2411-A86B-4252-9E73-36AD4A9E72D9}"/>
+              </a:ext>
+            </a:extLst>
+          </p:cNvPr>
+          <p:cNvSpPr txBox="1"/>
+          <p:nvPr/>
+        </p:nvSpPr>
+        <p:spPr>
+          <a:xfrm>
+            <a:off x="6347064" y="2989376"/>
+            <a:ext cx="2015296" cy="369332"/>
+          </a:xfrm>
+          <a:prstGeom prst="rect">
+            <a:avLst/>
+          </a:prstGeom>
+          <a:noFill/>
+        </p:spPr>
+        <p:txBody>
+          <a:bodyPr wrap="none" rtlCol="0">
+            <a:spAutoFit/>
+          </a:bodyPr>
+          <a:lstStyle/>
+          <a:p>
+            <a:pPr algn="ctr"/>
+            <a:r>
+              <a:rPr kumimoji="1" lang="en-US" altLang="ja-JP"/>
+              <a:t>SORACOM </a:t>
+            </a:r>
+            <a:r>
+              <a:rPr lang="en-US" altLang="ja-JP"/>
+              <a:t>Beam</a:t>
+            </a:r>
+            <a:endParaRPr kumimoji="1" lang="ja-JP" altLang="en-US"/>
+          </a:p>
+        </p:txBody>
+      </p:sp>
+      <p:pic>
+        <p:nvPicPr>
+          <p:cNvPr id="16" name="Graphic 18">
+            <a:extLst>
+              <a:ext uri="{FF2B5EF4-FFF2-40B4-BE49-F238E27FC236}">
+                <a16:creationId xmlns:a16="http://schemas.microsoft.com/office/drawing/2014/main" id="{35124958-138B-42F4-AC72-5FE330E35414}"/>
+              </a:ext>
+            </a:extLst>
+          </p:cNvPr>
+          <p:cNvPicPr>
+            <a:picLocks noChangeAspect="1"/>
+          </p:cNvPicPr>
+          <p:nvPr/>
+        </p:nvPicPr>
+        <p:blipFill>
+          <a:blip r:embed="rId6">
+            <a:extLst>
+              <a:ext uri="{96DAC541-7B7A-43D3-8B79-37D633B846F1}">
+                <asvg:svgBlip xmlns:asvg="http://schemas.microsoft.com/office/drawing/2016/SVG/main" r:embed="rId7"/>
+              </a:ext>
+            </a:extLst>
+          </a:blip>
+          <a:stretch>
+            <a:fillRect/>
+          </a:stretch>
+        </p:blipFill>
+        <p:spPr>
+          <a:xfrm>
+            <a:off x="9248730" y="1326803"/>
+            <a:ext cx="1223621" cy="1223621"/>
+          </a:xfrm>
+          <a:prstGeom prst="rect">
+            <a:avLst/>
+          </a:prstGeom>
+        </p:spPr>
+      </p:pic>
+      <p:sp>
+        <p:nvSpPr>
+          <p:cNvPr id="17" name="テキスト ボックス 16">
+            <a:extLst>
+              <a:ext uri="{FF2B5EF4-FFF2-40B4-BE49-F238E27FC236}">
+                <a16:creationId xmlns:a16="http://schemas.microsoft.com/office/drawing/2014/main" id="{F55A912E-0002-4D46-8A00-3A713C1789FA}"/>
+              </a:ext>
+            </a:extLst>
+          </p:cNvPr>
+          <p:cNvSpPr txBox="1"/>
+          <p:nvPr/>
+        </p:nvSpPr>
+        <p:spPr>
+          <a:xfrm>
+            <a:off x="9027619" y="2986568"/>
+            <a:ext cx="1665842" cy="369332"/>
+          </a:xfrm>
+          <a:prstGeom prst="rect">
+            <a:avLst/>
+          </a:prstGeom>
+          <a:noFill/>
+        </p:spPr>
+        <p:txBody>
+          <a:bodyPr wrap="none" rtlCol="0">
+            <a:spAutoFit/>
+          </a:bodyPr>
+          <a:lstStyle/>
+          <a:p>
+            <a:pPr algn="ctr"/>
+            <a:r>
+              <a:rPr kumimoji="1" lang="en-US" altLang="ja-JP"/>
+              <a:t>AWS IoT Core</a:t>
+            </a:r>
+            <a:endParaRPr kumimoji="1" lang="ja-JP" altLang="en-US"/>
+          </a:p>
+        </p:txBody>
+      </p:sp>
+      <p:cxnSp>
+        <p:nvCxnSpPr>
+          <p:cNvPr id="18" name="直線矢印コネクタ 17">
+            <a:extLst>
+              <a:ext uri="{FF2B5EF4-FFF2-40B4-BE49-F238E27FC236}">
+                <a16:creationId xmlns:a16="http://schemas.microsoft.com/office/drawing/2014/main" id="{48999EC8-E71B-49D5-A779-A2764591BB83}"/>
+              </a:ext>
+            </a:extLst>
+          </p:cNvPr>
+          <p:cNvCxnSpPr>
+            <a:cxnSpLocks/>
+          </p:cNvCxnSpPr>
+          <p:nvPr/>
+        </p:nvCxnSpPr>
+        <p:spPr>
+          <a:xfrm>
+            <a:off x="2663494" y="2004015"/>
+            <a:ext cx="855436" cy="0"/>
+          </a:xfrm>
+          <a:prstGeom prst="straightConnector1">
+            <a:avLst/>
+          </a:prstGeom>
+          <a:ln w="38100" cap="rnd">
+            <a:solidFill>
+              <a:schemeClr val="bg1">
+                <a:lumMod val="50000"/>
+              </a:schemeClr>
+            </a:solidFill>
+            <a:tailEnd type="arrow"/>
+          </a:ln>
+        </p:spPr>
+        <p:style>
+          <a:lnRef idx="1">
+            <a:schemeClr val="accent1"/>
+          </a:lnRef>
+          <a:fillRef idx="0">
+            <a:schemeClr val="accent1"/>
+          </a:fillRef>
+          <a:effectRef idx="0">
+            <a:schemeClr val="accent1"/>
+          </a:effectRef>
+          <a:fontRef idx="minor">
+            <a:schemeClr val="tx1"/>
+          </a:fontRef>
+        </p:style>
+      </p:cxnSp>
+      <p:cxnSp>
+        <p:nvCxnSpPr>
+          <p:cNvPr id="23" name="直線矢印コネクタ 22">
+            <a:extLst>
+              <a:ext uri="{FF2B5EF4-FFF2-40B4-BE49-F238E27FC236}">
+                <a16:creationId xmlns:a16="http://schemas.microsoft.com/office/drawing/2014/main" id="{1561B5BC-FC24-4BC1-8B94-5D5C1130D2CC}"/>
+              </a:ext>
+            </a:extLst>
+          </p:cNvPr>
+          <p:cNvCxnSpPr>
+            <a:cxnSpLocks/>
+          </p:cNvCxnSpPr>
+          <p:nvPr/>
+        </p:nvCxnSpPr>
+        <p:spPr>
+          <a:xfrm>
+            <a:off x="5701156" y="2004015"/>
+            <a:ext cx="855436" cy="0"/>
+          </a:xfrm>
+          <a:prstGeom prst="straightConnector1">
+            <a:avLst/>
+          </a:prstGeom>
+          <a:ln w="38100" cap="rnd">
+            <a:solidFill>
+              <a:schemeClr val="bg1">
+                <a:lumMod val="50000"/>
+              </a:schemeClr>
+            </a:solidFill>
+            <a:headEnd type="arrow"/>
+            <a:tailEnd type="arrow"/>
+          </a:ln>
+        </p:spPr>
+        <p:style>
+          <a:lnRef idx="1">
+            <a:schemeClr val="accent1"/>
+          </a:lnRef>
+          <a:fillRef idx="0">
+            <a:schemeClr val="accent1"/>
+          </a:fillRef>
+          <a:effectRef idx="0">
+            <a:schemeClr val="accent1"/>
+          </a:effectRef>
+          <a:fontRef idx="minor">
+            <a:schemeClr val="tx1"/>
+          </a:fontRef>
+        </p:style>
+      </p:cxnSp>
+      <p:cxnSp>
+        <p:nvCxnSpPr>
+          <p:cNvPr id="24" name="直線矢印コネクタ 23">
+            <a:extLst>
+              <a:ext uri="{FF2B5EF4-FFF2-40B4-BE49-F238E27FC236}">
+                <a16:creationId xmlns:a16="http://schemas.microsoft.com/office/drawing/2014/main" id="{502689B5-188B-4515-BA06-80E504951D95}"/>
+              </a:ext>
+            </a:extLst>
+          </p:cNvPr>
+          <p:cNvCxnSpPr>
+            <a:cxnSpLocks/>
+          </p:cNvCxnSpPr>
+          <p:nvPr/>
+        </p:nvCxnSpPr>
+        <p:spPr>
+          <a:xfrm>
+            <a:off x="8172183" y="2004015"/>
+            <a:ext cx="855436" cy="0"/>
+          </a:xfrm>
+          <a:prstGeom prst="straightConnector1">
+            <a:avLst/>
+          </a:prstGeom>
+          <a:ln w="38100" cap="rnd">
+            <a:solidFill>
+              <a:schemeClr val="bg1">
+                <a:lumMod val="50000"/>
+              </a:schemeClr>
+            </a:solidFill>
+            <a:headEnd type="arrow"/>
+            <a:tailEnd type="arrow"/>
+          </a:ln>
+        </p:spPr>
+        <p:style>
+          <a:lnRef idx="1">
+            <a:schemeClr val="accent1"/>
+          </a:lnRef>
+          <a:fillRef idx="0">
+            <a:schemeClr val="accent1"/>
+          </a:fillRef>
+          <a:effectRef idx="0">
+            <a:schemeClr val="accent1"/>
+          </a:effectRef>
+          <a:fontRef idx="minor">
+            <a:schemeClr val="tx1"/>
+          </a:fontRef>
+        </p:style>
+      </p:cxnSp>
+      <p:sp>
+        <p:nvSpPr>
+          <p:cNvPr id="22" name="テキスト ボックス 21">
+            <a:extLst>
+              <a:ext uri="{FF2B5EF4-FFF2-40B4-BE49-F238E27FC236}">
+                <a16:creationId xmlns:a16="http://schemas.microsoft.com/office/drawing/2014/main" id="{EDB91FD3-4F14-48C5-8605-4CD947CD3BC5}"/>
+              </a:ext>
+            </a:extLst>
+          </p:cNvPr>
+          <p:cNvSpPr txBox="1"/>
+          <p:nvPr/>
+        </p:nvSpPr>
+        <p:spPr>
+          <a:xfrm>
+            <a:off x="2822548" y="1563913"/>
+            <a:ext cx="537327" cy="369332"/>
+          </a:xfrm>
+          <a:prstGeom prst="rect">
+            <a:avLst/>
+          </a:prstGeom>
+          <a:noFill/>
+        </p:spPr>
+        <p:txBody>
+          <a:bodyPr wrap="none" rtlCol="0">
+            <a:spAutoFit/>
+          </a:bodyPr>
+          <a:lstStyle/>
+          <a:p>
+            <a:pPr algn="ctr"/>
+            <a:r>
+              <a:rPr kumimoji="1" lang="en-US" altLang="ja-JP"/>
+              <a:t>I2C</a:t>
+            </a:r>
+            <a:endParaRPr kumimoji="1" lang="ja-JP" altLang="en-US"/>
+          </a:p>
+        </p:txBody>
+      </p:sp>
+      <p:sp>
+        <p:nvSpPr>
+          <p:cNvPr id="26" name="テキスト ボックス 25">
+            <a:extLst>
+              <a:ext uri="{FF2B5EF4-FFF2-40B4-BE49-F238E27FC236}">
+                <a16:creationId xmlns:a16="http://schemas.microsoft.com/office/drawing/2014/main" id="{26C4DF4F-E57C-41D8-A5F2-D7002F89A692}"/>
+              </a:ext>
+            </a:extLst>
+          </p:cNvPr>
+          <p:cNvSpPr txBox="1"/>
+          <p:nvPr/>
+        </p:nvSpPr>
+        <p:spPr>
+          <a:xfrm>
+            <a:off x="5700712" y="1563913"/>
+            <a:ext cx="856325" cy="369332"/>
+          </a:xfrm>
+          <a:prstGeom prst="rect">
+            <a:avLst/>
+          </a:prstGeom>
+          <a:noFill/>
+        </p:spPr>
+        <p:txBody>
+          <a:bodyPr wrap="none" rtlCol="0">
+            <a:spAutoFit/>
+          </a:bodyPr>
+          <a:lstStyle/>
+          <a:p>
+            <a:pPr algn="ctr"/>
+            <a:r>
+              <a:rPr kumimoji="1" lang="en-US" altLang="ja-JP"/>
+              <a:t>MQTT</a:t>
+            </a:r>
+            <a:endParaRPr kumimoji="1" lang="ja-JP" altLang="en-US"/>
+          </a:p>
+        </p:txBody>
+      </p:sp>
+      <p:sp>
+        <p:nvSpPr>
+          <p:cNvPr id="27" name="テキスト ボックス 26">
+            <a:extLst>
+              <a:ext uri="{FF2B5EF4-FFF2-40B4-BE49-F238E27FC236}">
+                <a16:creationId xmlns:a16="http://schemas.microsoft.com/office/drawing/2014/main" id="{9DB8D170-4277-483B-89AF-DF4F3A7C004E}"/>
+              </a:ext>
+            </a:extLst>
+          </p:cNvPr>
+          <p:cNvSpPr txBox="1"/>
+          <p:nvPr/>
+        </p:nvSpPr>
+        <p:spPr>
+          <a:xfrm>
+            <a:off x="8099603" y="1563913"/>
+            <a:ext cx="1000595" cy="369332"/>
+          </a:xfrm>
+          <a:prstGeom prst="rect">
+            <a:avLst/>
+          </a:prstGeom>
+          <a:noFill/>
+        </p:spPr>
+        <p:txBody>
+          <a:bodyPr wrap="none" rtlCol="0">
+            <a:spAutoFit/>
+          </a:bodyPr>
+          <a:lstStyle/>
+          <a:p>
+            <a:pPr algn="ctr"/>
+            <a:r>
+              <a:rPr kumimoji="1" lang="en-US" altLang="ja-JP"/>
+              <a:t>MQTTS</a:t>
+            </a:r>
+            <a:endParaRPr kumimoji="1" lang="ja-JP" altLang="en-US"/>
+          </a:p>
+        </p:txBody>
+      </p:sp>
+      <p:sp>
+        <p:nvSpPr>
+          <p:cNvPr id="25" name="楕円 24">
+            <a:extLst>
+              <a:ext uri="{FF2B5EF4-FFF2-40B4-BE49-F238E27FC236}">
+                <a16:creationId xmlns:a16="http://schemas.microsoft.com/office/drawing/2014/main" id="{15B5C7C6-4F5C-448A-8993-6C3244BAF48F}"/>
+              </a:ext>
+            </a:extLst>
+          </p:cNvPr>
+          <p:cNvSpPr/>
+          <p:nvPr/>
+        </p:nvSpPr>
+        <p:spPr>
+          <a:xfrm>
+            <a:off x="4773336" y="2095043"/>
+            <a:ext cx="573512" cy="573512"/>
+          </a:xfrm>
+          <a:prstGeom prst="ellipse">
+            <a:avLst/>
+          </a:prstGeom>
+          <a:solidFill>
+            <a:srgbClr val="FF00FF"/>
+          </a:solidFill>
+          <a:ln>
+            <a:noFill/>
+          </a:ln>
+        </p:spPr>
+        <p:style>
+          <a:lnRef idx="2">
+            <a:schemeClr val="accent1">
+              <a:shade val="50000"/>
+            </a:schemeClr>
+          </a:lnRef>
+          <a:fillRef idx="1">
+            <a:schemeClr val="accent1"/>
+          </a:fillRef>
+          <a:effectRef idx="0">
+            <a:schemeClr val="accent1"/>
+          </a:effectRef>
+          <a:fontRef idx="minor">
+            <a:schemeClr val="lt1"/>
+          </a:fontRef>
+        </p:style>
+        <p:txBody>
+          <a:bodyPr wrap="none" rtlCol="0" anchor="ctr"/>
+          <a:lstStyle/>
+          <a:p>
+            <a:pPr algn="ctr"/>
+            <a:r>
+              <a:rPr lang="ja-JP" altLang="en-US" b="1"/>
+              <a:t>情報</a:t>
+            </a:r>
+            <a:endParaRPr kumimoji="1" lang="ja-JP" altLang="en-US" b="1"/>
+          </a:p>
+        </p:txBody>
+      </p:sp>
+      <p:sp>
+        <p:nvSpPr>
+          <p:cNvPr id="28" name="楕円 27">
+            <a:extLst>
+              <a:ext uri="{FF2B5EF4-FFF2-40B4-BE49-F238E27FC236}">
+                <a16:creationId xmlns:a16="http://schemas.microsoft.com/office/drawing/2014/main" id="{F122C36F-B46C-4BCE-88CC-675072DC5694}"/>
+              </a:ext>
+            </a:extLst>
+          </p:cNvPr>
+          <p:cNvSpPr/>
+          <p:nvPr/>
+        </p:nvSpPr>
+        <p:spPr>
+          <a:xfrm>
+            <a:off x="7302240" y="2095043"/>
+            <a:ext cx="573512" cy="573512"/>
+          </a:xfrm>
+          <a:prstGeom prst="ellipse">
+            <a:avLst/>
+          </a:prstGeom>
+          <a:solidFill>
+            <a:srgbClr val="FF00FF">
+              <a:alpha val="50196"/>
+            </a:srgbClr>
+          </a:solidFill>
+          <a:ln>
+            <a:noFill/>
+          </a:ln>
+        </p:spPr>
+        <p:style>
+          <a:lnRef idx="2">
+            <a:schemeClr val="accent1">
+              <a:shade val="50000"/>
+            </a:schemeClr>
+          </a:lnRef>
+          <a:fillRef idx="1">
+            <a:schemeClr val="accent1"/>
+          </a:fillRef>
+          <a:effectRef idx="0">
+            <a:schemeClr val="accent1"/>
+          </a:effectRef>
+          <a:fontRef idx="minor">
+            <a:schemeClr val="lt1"/>
+          </a:fontRef>
+        </p:style>
+        <p:txBody>
+          <a:bodyPr wrap="none" rtlCol="0" anchor="ctr"/>
+          <a:lstStyle/>
+          <a:p>
+            <a:pPr algn="ctr"/>
+            <a:r>
+              <a:rPr lang="ja-JP" altLang="en-US" b="1"/>
+              <a:t>情報</a:t>
+            </a:r>
+            <a:endParaRPr kumimoji="1" lang="ja-JP" altLang="en-US" b="1"/>
+          </a:p>
+        </p:txBody>
+      </p:sp>
+      <p:sp>
+        <p:nvSpPr>
+          <p:cNvPr id="2" name="矢印: 上カーブ 1">
+            <a:extLst>
+              <a:ext uri="{FF2B5EF4-FFF2-40B4-BE49-F238E27FC236}">
+                <a16:creationId xmlns:a16="http://schemas.microsoft.com/office/drawing/2014/main" id="{AFD1C824-6100-4BC8-AB7B-712FF2AA1538}"/>
+              </a:ext>
+            </a:extLst>
+          </p:cNvPr>
+          <p:cNvSpPr/>
+          <p:nvPr/>
+        </p:nvSpPr>
+        <p:spPr>
+          <a:xfrm>
+            <a:off x="5180629" y="2550317"/>
+            <a:ext cx="2495298" cy="293610"/>
+          </a:xfrm>
+          <a:prstGeom prst="curvedUpArrow">
+            <a:avLst>
+              <a:gd name="adj1" fmla="val 36250"/>
+              <a:gd name="adj2" fmla="val 110481"/>
+              <a:gd name="adj3" fmla="val 25000"/>
+            </a:avLst>
+          </a:prstGeom>
+          <a:solidFill>
+            <a:srgbClr val="FF00FF"/>
+          </a:solidFill>
+          <a:ln>
+            <a:noFill/>
+          </a:ln>
+        </p:spPr>
+        <p:style>
+          <a:lnRef idx="2">
+            <a:schemeClr val="accent1">
+              <a:shade val="50000"/>
+            </a:schemeClr>
+          </a:lnRef>
+          <a:fillRef idx="1">
+            <a:schemeClr val="accent1"/>
+          </a:fillRef>
+          <a:effectRef idx="0">
+            <a:schemeClr val="accent1"/>
+          </a:effectRef>
+          <a:fontRef idx="minor">
+            <a:schemeClr val="lt1"/>
+          </a:fontRef>
+        </p:style>
+        <p:txBody>
+          <a:bodyPr rtlCol="0" anchor="ctr"/>
+          <a:lstStyle/>
+          <a:p>
+            <a:pPr algn="ctr"/>
+            <a:endParaRPr kumimoji="1" lang="ja-JP" altLang="en-US">
+              <a:solidFill>
+                <a:schemeClr val="tx1"/>
+              </a:solidFill>
+            </a:endParaRPr>
+          </a:p>
+        </p:txBody>
+      </p:sp>
+    </p:spTree>
+    <p:extLst>
+      <p:ext uri="{BB962C8B-B14F-4D97-AF65-F5344CB8AC3E}">
+        <p14:creationId xmlns:p14="http://schemas.microsoft.com/office/powerpoint/2010/main" val="3052604300"/>
+      </p:ext>
+    </p:extLst>
+  </p:cSld>
+  <p:clrMapOvr>
+    <a:masterClrMapping/>
+  </p:clrMapOvr>
+</p:sld>
+</file>
+
 <file path=ppt/theme/theme1.xml><?xml version="1.0" encoding="utf-8"?>
 <a:theme xmlns:a="http://schemas.openxmlformats.org/drawingml/2006/main" name="Office テーマ">
   <a:themeElements>

</xml_diff>

<commit_message>
Add section 4 of handson3
</commit_message>
<xml_diff>
--- a/handson3/media/figure.pptx
+++ b/handson3/media/figure.pptx
@@ -13,6 +13,7 @@
     <p:sldId id="262" r:id="rId7"/>
     <p:sldId id="261" r:id="rId8"/>
     <p:sldId id="263" r:id="rId9"/>
+    <p:sldId id="264" r:id="rId10"/>
   </p:sldIdLst>
   <p:sldSz cx="12192000" cy="6858000"/>
   <p:notesSz cx="6858000" cy="9144000"/>
@@ -266,7 +267,7 @@
           <a:p>
             <a:fld id="{5A1C9A1D-F45E-4798-8D6C-555DCB791BF9}" type="datetimeFigureOut">
               <a:rPr kumimoji="1" lang="ja-JP" altLang="en-US" smtClean="0"/>
-              <a:t>2019/11/3</a:t>
+              <a:t>2019/11/4</a:t>
             </a:fld>
             <a:endParaRPr kumimoji="1" lang="ja-JP" altLang="en-US"/>
           </a:p>
@@ -496,7 +497,7 @@
           <a:p>
             <a:fld id="{5A1C9A1D-F45E-4798-8D6C-555DCB791BF9}" type="datetimeFigureOut">
               <a:rPr kumimoji="1" lang="ja-JP" altLang="en-US" smtClean="0"/>
-              <a:t>2019/11/3</a:t>
+              <a:t>2019/11/4</a:t>
             </a:fld>
             <a:endParaRPr kumimoji="1" lang="ja-JP" altLang="en-US"/>
           </a:p>
@@ -736,7 +737,7 @@
           <a:p>
             <a:fld id="{5A1C9A1D-F45E-4798-8D6C-555DCB791BF9}" type="datetimeFigureOut">
               <a:rPr kumimoji="1" lang="ja-JP" altLang="en-US" smtClean="0"/>
-              <a:t>2019/11/3</a:t>
+              <a:t>2019/11/4</a:t>
             </a:fld>
             <a:endParaRPr kumimoji="1" lang="ja-JP" altLang="en-US"/>
           </a:p>
@@ -966,7 +967,7 @@
           <a:p>
             <a:fld id="{5A1C9A1D-F45E-4798-8D6C-555DCB791BF9}" type="datetimeFigureOut">
               <a:rPr kumimoji="1" lang="ja-JP" altLang="en-US" smtClean="0"/>
-              <a:t>2019/11/3</a:t>
+              <a:t>2019/11/4</a:t>
             </a:fld>
             <a:endParaRPr kumimoji="1" lang="ja-JP" altLang="en-US"/>
           </a:p>
@@ -1241,7 +1242,7 @@
           <a:p>
             <a:fld id="{5A1C9A1D-F45E-4798-8D6C-555DCB791BF9}" type="datetimeFigureOut">
               <a:rPr kumimoji="1" lang="ja-JP" altLang="en-US" smtClean="0"/>
-              <a:t>2019/11/3</a:t>
+              <a:t>2019/11/4</a:t>
             </a:fld>
             <a:endParaRPr kumimoji="1" lang="ja-JP" altLang="en-US"/>
           </a:p>
@@ -1570,7 +1571,7 @@
           <a:p>
             <a:fld id="{5A1C9A1D-F45E-4798-8D6C-555DCB791BF9}" type="datetimeFigureOut">
               <a:rPr kumimoji="1" lang="ja-JP" altLang="en-US" smtClean="0"/>
-              <a:t>2019/11/3</a:t>
+              <a:t>2019/11/4</a:t>
             </a:fld>
             <a:endParaRPr kumimoji="1" lang="ja-JP" altLang="en-US"/>
           </a:p>
@@ -2046,7 +2047,7 @@
           <a:p>
             <a:fld id="{5A1C9A1D-F45E-4798-8D6C-555DCB791BF9}" type="datetimeFigureOut">
               <a:rPr kumimoji="1" lang="ja-JP" altLang="en-US" smtClean="0"/>
-              <a:t>2019/11/3</a:t>
+              <a:t>2019/11/4</a:t>
             </a:fld>
             <a:endParaRPr kumimoji="1" lang="ja-JP" altLang="en-US"/>
           </a:p>
@@ -2187,7 +2188,7 @@
           <a:p>
             <a:fld id="{5A1C9A1D-F45E-4798-8D6C-555DCB791BF9}" type="datetimeFigureOut">
               <a:rPr kumimoji="1" lang="ja-JP" altLang="en-US" smtClean="0"/>
-              <a:t>2019/11/3</a:t>
+              <a:t>2019/11/4</a:t>
             </a:fld>
             <a:endParaRPr kumimoji="1" lang="ja-JP" altLang="en-US"/>
           </a:p>
@@ -2300,7 +2301,7 @@
           <a:p>
             <a:fld id="{5A1C9A1D-F45E-4798-8D6C-555DCB791BF9}" type="datetimeFigureOut">
               <a:rPr kumimoji="1" lang="ja-JP" altLang="en-US" smtClean="0"/>
-              <a:t>2019/11/3</a:t>
+              <a:t>2019/11/4</a:t>
             </a:fld>
             <a:endParaRPr kumimoji="1" lang="ja-JP" altLang="en-US"/>
           </a:p>
@@ -2643,7 +2644,7 @@
           <a:p>
             <a:fld id="{5A1C9A1D-F45E-4798-8D6C-555DCB791BF9}" type="datetimeFigureOut">
               <a:rPr kumimoji="1" lang="ja-JP" altLang="en-US" smtClean="0"/>
-              <a:t>2019/11/3</a:t>
+              <a:t>2019/11/4</a:t>
             </a:fld>
             <a:endParaRPr kumimoji="1" lang="ja-JP" altLang="en-US"/>
           </a:p>
@@ -2931,7 +2932,7 @@
           <a:p>
             <a:fld id="{5A1C9A1D-F45E-4798-8D6C-555DCB791BF9}" type="datetimeFigureOut">
               <a:rPr kumimoji="1" lang="ja-JP" altLang="en-US" smtClean="0"/>
-              <a:t>2019/11/3</a:t>
+              <a:t>2019/11/4</a:t>
             </a:fld>
             <a:endParaRPr kumimoji="1" lang="ja-JP" altLang="en-US"/>
           </a:p>
@@ -3204,7 +3205,7 @@
           <a:p>
             <a:fld id="{5A1C9A1D-F45E-4798-8D6C-555DCB791BF9}" type="datetimeFigureOut">
               <a:rPr kumimoji="1" lang="ja-JP" altLang="en-US" smtClean="0"/>
-              <a:t>2019/11/3</a:t>
+              <a:t>2019/11/4</a:t>
             </a:fld>
             <a:endParaRPr kumimoji="1" lang="ja-JP" altLang="en-US"/>
           </a:p>
@@ -9020,6 +9021,274 @@
 </p:sld>
 </file>
 
+<file path=ppt/slides/slide9.xml><?xml version="1.0" encoding="utf-8"?>
+<p:sld xmlns:a="http://schemas.openxmlformats.org/drawingml/2006/main" xmlns:r="http://schemas.openxmlformats.org/officeDocument/2006/relationships" xmlns:p="http://schemas.openxmlformats.org/presentationml/2006/main">
+  <p:cSld>
+    <p:spTree>
+      <p:nvGrpSpPr>
+        <p:cNvPr id="1" name=""/>
+        <p:cNvGrpSpPr/>
+        <p:nvPr/>
+      </p:nvGrpSpPr>
+      <p:grpSpPr>
+        <a:xfrm>
+          <a:off x="0" y="0"/>
+          <a:ext cx="0" cy="0"/>
+          <a:chOff x="0" y="0"/>
+          <a:chExt cx="0" cy="0"/>
+        </a:xfrm>
+      </p:grpSpPr>
+      <p:pic>
+        <p:nvPicPr>
+          <p:cNvPr id="3" name="図 2">
+            <a:extLst>
+              <a:ext uri="{FF2B5EF4-FFF2-40B4-BE49-F238E27FC236}">
+                <a16:creationId xmlns:a16="http://schemas.microsoft.com/office/drawing/2014/main" id="{10B931A8-34C0-4524-9F2C-C823C1D538E0}"/>
+              </a:ext>
+            </a:extLst>
+          </p:cNvPr>
+          <p:cNvPicPr>
+            <a:picLocks noChangeAspect="1"/>
+          </p:cNvPicPr>
+          <p:nvPr/>
+        </p:nvPicPr>
+        <p:blipFill>
+          <a:blip r:embed="rId2"/>
+          <a:stretch>
+            <a:fillRect/>
+          </a:stretch>
+        </p:blipFill>
+        <p:spPr>
+          <a:xfrm>
+            <a:off x="1852612" y="990600"/>
+            <a:ext cx="8486775" cy="4876800"/>
+          </a:xfrm>
+          <a:prstGeom prst="rect">
+            <a:avLst/>
+          </a:prstGeom>
+        </p:spPr>
+      </p:pic>
+      <p:sp>
+        <p:nvSpPr>
+          <p:cNvPr id="4" name="正方形/長方形 3">
+            <a:extLst>
+              <a:ext uri="{FF2B5EF4-FFF2-40B4-BE49-F238E27FC236}">
+                <a16:creationId xmlns:a16="http://schemas.microsoft.com/office/drawing/2014/main" id="{8D79161F-A0EF-4ADD-90DF-E818EB31F21F}"/>
+              </a:ext>
+            </a:extLst>
+          </p:cNvPr>
+          <p:cNvSpPr/>
+          <p:nvPr/>
+        </p:nvSpPr>
+        <p:spPr>
+          <a:xfrm>
+            <a:off x="1935950" y="1086104"/>
+            <a:ext cx="3241963" cy="783770"/>
+          </a:xfrm>
+          <a:prstGeom prst="rect">
+            <a:avLst/>
+          </a:prstGeom>
+          <a:noFill/>
+          <a:ln w="38100">
+            <a:solidFill>
+              <a:srgbClr val="FF0000"/>
+            </a:solidFill>
+          </a:ln>
+        </p:spPr>
+        <p:style>
+          <a:lnRef idx="2">
+            <a:schemeClr val="accent1">
+              <a:shade val="50000"/>
+            </a:schemeClr>
+          </a:lnRef>
+          <a:fillRef idx="1">
+            <a:schemeClr val="accent1"/>
+          </a:fillRef>
+          <a:effectRef idx="0">
+            <a:schemeClr val="accent1"/>
+          </a:effectRef>
+          <a:fontRef idx="minor">
+            <a:schemeClr val="lt1"/>
+          </a:fontRef>
+        </p:style>
+        <p:txBody>
+          <a:bodyPr rtlCol="0" anchor="ctr"/>
+          <a:lstStyle/>
+          <a:p>
+            <a:pPr algn="ctr"/>
+            <a:endParaRPr kumimoji="1" lang="ja-JP" altLang="en-US"/>
+          </a:p>
+        </p:txBody>
+      </p:sp>
+      <p:sp>
+        <p:nvSpPr>
+          <p:cNvPr id="6" name="正方形/長方形 5">
+            <a:extLst>
+              <a:ext uri="{FF2B5EF4-FFF2-40B4-BE49-F238E27FC236}">
+                <a16:creationId xmlns:a16="http://schemas.microsoft.com/office/drawing/2014/main" id="{39BB97C8-B1AF-4005-8582-E23568FF9A28}"/>
+              </a:ext>
+            </a:extLst>
+          </p:cNvPr>
+          <p:cNvSpPr/>
+          <p:nvPr/>
+        </p:nvSpPr>
+        <p:spPr>
+          <a:xfrm>
+            <a:off x="1935950" y="5188405"/>
+            <a:ext cx="3241963" cy="577064"/>
+          </a:xfrm>
+          <a:prstGeom prst="rect">
+            <a:avLst/>
+          </a:prstGeom>
+          <a:noFill/>
+          <a:ln w="38100">
+            <a:solidFill>
+              <a:srgbClr val="FF0000"/>
+            </a:solidFill>
+          </a:ln>
+        </p:spPr>
+        <p:style>
+          <a:lnRef idx="2">
+            <a:schemeClr val="accent1">
+              <a:shade val="50000"/>
+            </a:schemeClr>
+          </a:lnRef>
+          <a:fillRef idx="1">
+            <a:schemeClr val="accent1"/>
+          </a:fillRef>
+          <a:effectRef idx="0">
+            <a:schemeClr val="accent1"/>
+          </a:effectRef>
+          <a:fontRef idx="minor">
+            <a:schemeClr val="lt1"/>
+          </a:fontRef>
+        </p:style>
+        <p:txBody>
+          <a:bodyPr rtlCol="0" anchor="ctr"/>
+          <a:lstStyle/>
+          <a:p>
+            <a:pPr algn="ctr"/>
+            <a:endParaRPr kumimoji="1" lang="ja-JP" altLang="en-US"/>
+          </a:p>
+        </p:txBody>
+      </p:sp>
+      <p:sp>
+        <p:nvSpPr>
+          <p:cNvPr id="7" name="正方形/長方形 6">
+            <a:extLst>
+              <a:ext uri="{FF2B5EF4-FFF2-40B4-BE49-F238E27FC236}">
+                <a16:creationId xmlns:a16="http://schemas.microsoft.com/office/drawing/2014/main" id="{D6D4A6AB-E0D9-40B4-B594-603A2D283188}"/>
+              </a:ext>
+            </a:extLst>
+          </p:cNvPr>
+          <p:cNvSpPr/>
+          <p:nvPr/>
+        </p:nvSpPr>
+        <p:spPr>
+          <a:xfrm>
+            <a:off x="4093828" y="3798992"/>
+            <a:ext cx="1202567" cy="274244"/>
+          </a:xfrm>
+          <a:prstGeom prst="rect">
+            <a:avLst/>
+          </a:prstGeom>
+          <a:noFill/>
+          <a:ln w="38100">
+            <a:solidFill>
+              <a:srgbClr val="FF0000"/>
+            </a:solidFill>
+          </a:ln>
+        </p:spPr>
+        <p:style>
+          <a:lnRef idx="2">
+            <a:schemeClr val="accent1">
+              <a:shade val="50000"/>
+            </a:schemeClr>
+          </a:lnRef>
+          <a:fillRef idx="1">
+            <a:schemeClr val="accent1"/>
+          </a:fillRef>
+          <a:effectRef idx="0">
+            <a:schemeClr val="accent1"/>
+          </a:effectRef>
+          <a:fontRef idx="minor">
+            <a:schemeClr val="lt1"/>
+          </a:fontRef>
+        </p:style>
+        <p:txBody>
+          <a:bodyPr rtlCol="0" anchor="ctr"/>
+          <a:lstStyle/>
+          <a:p>
+            <a:pPr algn="ctr"/>
+            <a:endParaRPr kumimoji="1" lang="ja-JP" altLang="en-US"/>
+          </a:p>
+        </p:txBody>
+      </p:sp>
+      <p:sp>
+        <p:nvSpPr>
+          <p:cNvPr id="8" name="正方形/長方形 7">
+            <a:extLst>
+              <a:ext uri="{FF2B5EF4-FFF2-40B4-BE49-F238E27FC236}">
+                <a16:creationId xmlns:a16="http://schemas.microsoft.com/office/drawing/2014/main" id="{B3EEEB6C-1AA9-4B22-B6A1-959443D5E227}"/>
+              </a:ext>
+            </a:extLst>
+          </p:cNvPr>
+          <p:cNvSpPr/>
+          <p:nvPr/>
+        </p:nvSpPr>
+        <p:spPr>
+          <a:xfrm>
+            <a:off x="3095539" y="2037248"/>
+            <a:ext cx="998290" cy="274244"/>
+          </a:xfrm>
+          <a:prstGeom prst="rect">
+            <a:avLst/>
+          </a:prstGeom>
+          <a:noFill/>
+          <a:ln w="38100">
+            <a:solidFill>
+              <a:srgbClr val="FF0000"/>
+            </a:solidFill>
+          </a:ln>
+        </p:spPr>
+        <p:style>
+          <a:lnRef idx="2">
+            <a:schemeClr val="accent1">
+              <a:shade val="50000"/>
+            </a:schemeClr>
+          </a:lnRef>
+          <a:fillRef idx="1">
+            <a:schemeClr val="accent1"/>
+          </a:fillRef>
+          <a:effectRef idx="0">
+            <a:schemeClr val="accent1"/>
+          </a:effectRef>
+          <a:fontRef idx="minor">
+            <a:schemeClr val="lt1"/>
+          </a:fontRef>
+        </p:style>
+        <p:txBody>
+          <a:bodyPr rtlCol="0" anchor="ctr"/>
+          <a:lstStyle/>
+          <a:p>
+            <a:pPr algn="ctr"/>
+            <a:endParaRPr kumimoji="1" lang="ja-JP" altLang="en-US"/>
+          </a:p>
+        </p:txBody>
+      </p:sp>
+    </p:spTree>
+    <p:extLst>
+      <p:ext uri="{BB962C8B-B14F-4D97-AF65-F5344CB8AC3E}">
+        <p14:creationId xmlns:p14="http://schemas.microsoft.com/office/powerpoint/2010/main" val="3833049034"/>
+      </p:ext>
+    </p:extLst>
+  </p:cSld>
+  <p:clrMapOvr>
+    <a:masterClrMapping/>
+  </p:clrMapOvr>
+</p:sld>
+</file>
+
 <file path=ppt/theme/theme1.xml><?xml version="1.0" encoding="utf-8"?>
 <a:theme xmlns:a="http://schemas.openxmlformats.org/drawingml/2006/main" name="Office テーマ">
   <a:themeElements>

</xml_diff>